<commit_message>
Almost finished project presentation
</commit_message>
<xml_diff>
--- a/ProjectPresentation.pptx
+++ b/ProjectPresentation.pptx
@@ -7,10 +7,20 @@
   <p:sldIdLst>
     <p:sldId id="256" r:id="rId2"/>
     <p:sldId id="257" r:id="rId3"/>
-    <p:sldId id="258" r:id="rId4"/>
-    <p:sldId id="259" r:id="rId5"/>
-    <p:sldId id="260" r:id="rId6"/>
-    <p:sldId id="261" r:id="rId7"/>
+    <p:sldId id="259" r:id="rId4"/>
+    <p:sldId id="267" r:id="rId5"/>
+    <p:sldId id="258" r:id="rId6"/>
+    <p:sldId id="262" r:id="rId7"/>
+    <p:sldId id="263" r:id="rId8"/>
+    <p:sldId id="264" r:id="rId9"/>
+    <p:sldId id="265" r:id="rId10"/>
+    <p:sldId id="266" r:id="rId11"/>
+    <p:sldId id="271" r:id="rId12"/>
+    <p:sldId id="270" r:id="rId13"/>
+    <p:sldId id="272" r:id="rId14"/>
+    <p:sldId id="260" r:id="rId15"/>
+    <p:sldId id="273" r:id="rId16"/>
+    <p:sldId id="261" r:id="rId17"/>
   </p:sldIdLst>
   <p:sldSz cx="12192000" cy="6858000"/>
   <p:notesSz cx="6858000" cy="9144000"/>
@@ -109,6 +119,11 @@
       </a:defRPr>
     </a:lvl9pPr>
   </p:defaultTextStyle>
+  <p:extLst>
+    <p:ext uri="{EFAFB233-063F-42B5-8137-9DF3F51BA10A}">
+      <p15:sldGuideLst xmlns:p15="http://schemas.microsoft.com/office/powerpoint/2012/main"/>
+    </p:ext>
+  </p:extLst>
 </p:presentation>
 </file>
 
@@ -157,7 +172,6 @@
               <a:rPr lang="en-US"/>
               <a:t>Click to edit Master title style</a:t>
             </a:r>
-            <a:endParaRPr lang="en-US"/>
           </a:p>
         </p:txBody>
       </p:sp>
@@ -222,7 +236,6 @@
               <a:rPr lang="en-US"/>
               <a:t>Click to edit Master subtitle style</a:t>
             </a:r>
-            <a:endParaRPr lang="en-US"/>
           </a:p>
         </p:txBody>
       </p:sp>
@@ -243,7 +256,7 @@
           <a:p>
             <a:fld id="{2EE3083F-0E46-4DA8-9630-BEE304DE81B0}" type="datetimeFigureOut">
               <a:rPr lang="en-US" smtClean="0"/>
-              <a:t>4/7/2017</a:t>
+              <a:t>4/30/2017</a:t>
             </a:fld>
             <a:endParaRPr lang="en-US"/>
           </a:p>
@@ -340,7 +353,6 @@
               <a:rPr lang="en-US"/>
               <a:t>Click to edit Master title style</a:t>
             </a:r>
-            <a:endParaRPr lang="en-US"/>
           </a:p>
         </p:txBody>
       </p:sp>
@@ -392,7 +404,6 @@
               <a:rPr lang="en-US"/>
               <a:t>Fifth level</a:t>
             </a:r>
-            <a:endParaRPr lang="en-US"/>
           </a:p>
         </p:txBody>
       </p:sp>
@@ -413,7 +424,7 @@
           <a:p>
             <a:fld id="{2EE3083F-0E46-4DA8-9630-BEE304DE81B0}" type="datetimeFigureOut">
               <a:rPr lang="en-US" smtClean="0"/>
-              <a:t>4/7/2017</a:t>
+              <a:t>4/30/2017</a:t>
             </a:fld>
             <a:endParaRPr lang="en-US"/>
           </a:p>
@@ -515,7 +526,6 @@
               <a:rPr lang="en-US"/>
               <a:t>Click to edit Master title style</a:t>
             </a:r>
-            <a:endParaRPr lang="en-US"/>
           </a:p>
         </p:txBody>
       </p:sp>
@@ -572,7 +582,6 @@
               <a:rPr lang="en-US"/>
               <a:t>Fifth level</a:t>
             </a:r>
-            <a:endParaRPr lang="en-US"/>
           </a:p>
         </p:txBody>
       </p:sp>
@@ -593,7 +602,7 @@
           <a:p>
             <a:fld id="{2EE3083F-0E46-4DA8-9630-BEE304DE81B0}" type="datetimeFigureOut">
               <a:rPr lang="en-US" smtClean="0"/>
-              <a:t>4/7/2017</a:t>
+              <a:t>4/30/2017</a:t>
             </a:fld>
             <a:endParaRPr lang="en-US"/>
           </a:p>
@@ -690,7 +699,6 @@
               <a:rPr lang="en-US"/>
               <a:t>Click to edit Master title style</a:t>
             </a:r>
-            <a:endParaRPr lang="en-US"/>
           </a:p>
         </p:txBody>
       </p:sp>
@@ -742,7 +750,6 @@
               <a:rPr lang="en-US"/>
               <a:t>Fifth level</a:t>
             </a:r>
-            <a:endParaRPr lang="en-US"/>
           </a:p>
         </p:txBody>
       </p:sp>
@@ -763,7 +770,7 @@
           <a:p>
             <a:fld id="{2EE3083F-0E46-4DA8-9630-BEE304DE81B0}" type="datetimeFigureOut">
               <a:rPr lang="en-US" smtClean="0"/>
-              <a:t>4/7/2017</a:t>
+              <a:t>4/30/2017</a:t>
             </a:fld>
             <a:endParaRPr lang="en-US"/>
           </a:p>
@@ -869,7 +876,6 @@
               <a:rPr lang="en-US"/>
               <a:t>Click to edit Master title style</a:t>
             </a:r>
-            <a:endParaRPr lang="en-US"/>
           </a:p>
         </p:txBody>
       </p:sp>
@@ -1009,7 +1015,7 @@
           <a:p>
             <a:fld id="{2EE3083F-0E46-4DA8-9630-BEE304DE81B0}" type="datetimeFigureOut">
               <a:rPr lang="en-US" smtClean="0"/>
-              <a:t>4/7/2017</a:t>
+              <a:t>4/30/2017</a:t>
             </a:fld>
             <a:endParaRPr lang="en-US"/>
           </a:p>
@@ -1106,7 +1112,6 @@
               <a:rPr lang="en-US"/>
               <a:t>Click to edit Master title style</a:t>
             </a:r>
-            <a:endParaRPr lang="en-US"/>
           </a:p>
         </p:txBody>
       </p:sp>
@@ -1163,7 +1168,6 @@
               <a:rPr lang="en-US"/>
               <a:t>Fifth level</a:t>
             </a:r>
-            <a:endParaRPr lang="en-US"/>
           </a:p>
         </p:txBody>
       </p:sp>
@@ -1220,7 +1224,6 @@
               <a:rPr lang="en-US"/>
               <a:t>Fifth level</a:t>
             </a:r>
-            <a:endParaRPr lang="en-US"/>
           </a:p>
         </p:txBody>
       </p:sp>
@@ -1241,7 +1244,7 @@
           <a:p>
             <a:fld id="{2EE3083F-0E46-4DA8-9630-BEE304DE81B0}" type="datetimeFigureOut">
               <a:rPr lang="en-US" smtClean="0"/>
-              <a:t>4/7/2017</a:t>
+              <a:t>4/30/2017</a:t>
             </a:fld>
             <a:endParaRPr lang="en-US"/>
           </a:p>
@@ -1343,7 +1346,6 @@
               <a:rPr lang="en-US"/>
               <a:t>Click to edit Master title style</a:t>
             </a:r>
-            <a:endParaRPr lang="en-US"/>
           </a:p>
         </p:txBody>
       </p:sp>
@@ -1465,7 +1467,6 @@
               <a:rPr lang="en-US"/>
               <a:t>Fifth level</a:t>
             </a:r>
-            <a:endParaRPr lang="en-US"/>
           </a:p>
         </p:txBody>
       </p:sp>
@@ -1587,7 +1588,6 @@
               <a:rPr lang="en-US"/>
               <a:t>Fifth level</a:t>
             </a:r>
-            <a:endParaRPr lang="en-US"/>
           </a:p>
         </p:txBody>
       </p:sp>
@@ -1608,7 +1608,7 @@
           <a:p>
             <a:fld id="{2EE3083F-0E46-4DA8-9630-BEE304DE81B0}" type="datetimeFigureOut">
               <a:rPr lang="en-US" smtClean="0"/>
-              <a:t>4/7/2017</a:t>
+              <a:t>4/30/2017</a:t>
             </a:fld>
             <a:endParaRPr lang="en-US"/>
           </a:p>
@@ -1705,7 +1705,6 @@
               <a:rPr lang="en-US"/>
               <a:t>Click to edit Master title style</a:t>
             </a:r>
-            <a:endParaRPr lang="en-US"/>
           </a:p>
         </p:txBody>
       </p:sp>
@@ -1726,7 +1725,7 @@
           <a:p>
             <a:fld id="{2EE3083F-0E46-4DA8-9630-BEE304DE81B0}" type="datetimeFigureOut">
               <a:rPr lang="en-US" smtClean="0"/>
-              <a:t>4/7/2017</a:t>
+              <a:t>4/30/2017</a:t>
             </a:fld>
             <a:endParaRPr lang="en-US"/>
           </a:p>
@@ -1821,7 +1820,7 @@
           <a:p>
             <a:fld id="{2EE3083F-0E46-4DA8-9630-BEE304DE81B0}" type="datetimeFigureOut">
               <a:rPr lang="en-US" smtClean="0"/>
-              <a:t>4/7/2017</a:t>
+              <a:t>4/30/2017</a:t>
             </a:fld>
             <a:endParaRPr lang="en-US"/>
           </a:p>
@@ -1927,7 +1926,6 @@
               <a:rPr lang="en-US"/>
               <a:t>Click to edit Master title style</a:t>
             </a:r>
-            <a:endParaRPr lang="en-US"/>
           </a:p>
         </p:txBody>
       </p:sp>
@@ -2012,7 +2010,6 @@
               <a:rPr lang="en-US"/>
               <a:t>Fifth level</a:t>
             </a:r>
-            <a:endParaRPr lang="en-US"/>
           </a:p>
         </p:txBody>
       </p:sp>
@@ -2098,7 +2095,7 @@
           <a:p>
             <a:fld id="{2EE3083F-0E46-4DA8-9630-BEE304DE81B0}" type="datetimeFigureOut">
               <a:rPr lang="en-US" smtClean="0"/>
-              <a:t>4/7/2017</a:t>
+              <a:t>4/30/2017</a:t>
             </a:fld>
             <a:endParaRPr lang="en-US"/>
           </a:p>
@@ -2204,7 +2201,6 @@
               <a:rPr lang="en-US"/>
               <a:t>Click to edit Master title style</a:t>
             </a:r>
-            <a:endParaRPr lang="en-US"/>
           </a:p>
         </p:txBody>
       </p:sp>
@@ -2351,7 +2347,7 @@
           <a:p>
             <a:fld id="{2EE3083F-0E46-4DA8-9630-BEE304DE81B0}" type="datetimeFigureOut">
               <a:rPr lang="en-US" smtClean="0"/>
-              <a:t>4/7/2017</a:t>
+              <a:t>4/30/2017</a:t>
             </a:fld>
             <a:endParaRPr lang="en-US"/>
           </a:p>
@@ -2463,7 +2459,6 @@
               <a:rPr lang="en-US"/>
               <a:t>Click to edit Master title style</a:t>
             </a:r>
-            <a:endParaRPr lang="en-US"/>
           </a:p>
         </p:txBody>
       </p:sp>
@@ -2525,7 +2520,6 @@
               <a:rPr lang="en-US"/>
               <a:t>Fifth level</a:t>
             </a:r>
-            <a:endParaRPr lang="en-US"/>
           </a:p>
         </p:txBody>
       </p:sp>
@@ -2564,7 +2558,7 @@
           <a:p>
             <a:fld id="{2EE3083F-0E46-4DA8-9630-BEE304DE81B0}" type="datetimeFigureOut">
               <a:rPr lang="en-US" smtClean="0"/>
-              <a:t>4/7/2017</a:t>
+              <a:t>4/30/2017</a:t>
             </a:fld>
             <a:endParaRPr lang="en-US"/>
           </a:p>
@@ -2971,81 +2965,158 @@
       </p:grpSpPr>
       <p:sp>
         <p:nvSpPr>
-          <p:cNvPr id="3" name="Subtitle 2"/>
-          <p:cNvSpPr>
-            <a:spLocks noGrp="1"/>
-          </p:cNvSpPr>
-          <p:nvPr>
-            <p:ph type="subTitle" idx="1"/>
-          </p:nvPr>
-        </p:nvSpPr>
-        <p:spPr>
-          <a:xfrm>
-            <a:off x="761999" y="4100698"/>
-            <a:ext cx="10668000" cy="1655762"/>
-          </a:xfrm>
-        </p:spPr>
-        <p:txBody>
-          <a:bodyPr/>
-          <a:lstStyle/>
-          <a:p>
-            <a:r>
-              <a:rPr lang="en-US" dirty="0"/>
-              <a:t>Jasmine </a:t>
-            </a:r>
-            <a:r>
-              <a:rPr lang="en-US" dirty="0" err="1"/>
-              <a:t>Rethmann</a:t>
-            </a:r>
-            <a:r>
-              <a:rPr lang="en-US" dirty="0"/>
-              <a:t>, Lucas </a:t>
-            </a:r>
-            <a:r>
-              <a:rPr lang="en-US" dirty="0" err="1"/>
-              <a:t>Dachman</a:t>
-            </a:r>
-            <a:r>
-              <a:rPr lang="en-US" dirty="0"/>
-              <a:t>, </a:t>
-            </a:r>
-            <a:r>
-              <a:rPr lang="en-US" dirty="0" err="1"/>
-              <a:t>Nihar</a:t>
-            </a:r>
-            <a:r>
-              <a:rPr lang="en-US" dirty="0"/>
-              <a:t> </a:t>
-            </a:r>
-            <a:r>
-              <a:rPr lang="en-US" dirty="0" err="1"/>
-              <a:t>Nandan</a:t>
-            </a:r>
-            <a:r>
-              <a:rPr lang="en-US" dirty="0"/>
-              <a:t>, Jonathan </a:t>
-            </a:r>
-            <a:r>
-              <a:rPr lang="en-US" dirty="0" err="1"/>
-              <a:t>Taing</a:t>
-            </a:r>
-            <a:r>
-              <a:rPr lang="en-US" dirty="0"/>
-              <a:t>, </a:t>
-            </a:r>
-            <a:r>
-              <a:rPr lang="en-US" dirty="0" err="1"/>
-              <a:t>Ningtian</a:t>
-            </a:r>
-            <a:r>
-              <a:rPr lang="en-US" dirty="0"/>
-              <a:t> </a:t>
-            </a:r>
-            <a:r>
-              <a:rPr lang="en-US" dirty="0" err="1"/>
-              <a:t>Ruan</a:t>
-            </a:r>
-            <a:endParaRPr lang="en-US" dirty="0"/>
+          <p:cNvPr id="13" name="Rectangle 8"/>
+          <p:cNvSpPr>
+            <a:spLocks noGrp="1" noRot="1" noChangeAspect="1" noMove="1" noResize="1" noEditPoints="1" noAdjustHandles="1" noChangeArrowheads="1" noChangeShapeType="1" noTextEdit="1"/>
+          </p:cNvSpPr>
+          <p:nvPr>
+            <p:extLst>
+              <p:ext uri="{386F3935-93C4-4BCD-93E2-E3B085C9AB24}">
+                <p16:designElem xmlns:p16="http://schemas.microsoft.com/office/powerpoint/2015/main" val="1"/>
+              </p:ext>
+            </p:extLst>
+          </p:nvPr>
+        </p:nvSpPr>
+        <p:spPr>
+          <a:xfrm>
+            <a:off x="7467712" y="-3324"/>
+            <a:ext cx="4724288" cy="6861324"/>
+          </a:xfrm>
+          <a:prstGeom prst="rect">
+            <a:avLst/>
+          </a:prstGeom>
+          <a:solidFill>
+            <a:schemeClr val="tx1">
+              <a:alpha val="81000"/>
+            </a:schemeClr>
+          </a:solidFill>
+          <a:ln>
+            <a:noFill/>
+          </a:ln>
+        </p:spPr>
+        <p:style>
+          <a:lnRef idx="2">
+            <a:schemeClr val="accent1">
+              <a:shade val="50000"/>
+            </a:schemeClr>
+          </a:lnRef>
+          <a:fillRef idx="1">
+            <a:schemeClr val="accent1"/>
+          </a:fillRef>
+          <a:effectRef idx="0">
+            <a:schemeClr val="accent1"/>
+          </a:effectRef>
+          <a:fontRef idx="minor">
+            <a:schemeClr val="lt1"/>
+          </a:fontRef>
+        </p:style>
+        <p:txBody>
+          <a:bodyPr rtlCol="0" anchor="ctr"/>
+          <a:lstStyle/>
+          <a:p>
+            <a:pPr algn="ctr"/>
+            <a:endParaRPr lang="en-US"/>
+          </a:p>
+        </p:txBody>
+      </p:sp>
+      <p:sp>
+        <p:nvSpPr>
+          <p:cNvPr id="14" name="Freeform: Shape 10"/>
+          <p:cNvSpPr>
+            <a:spLocks noGrp="1" noRot="1" noChangeAspect="1" noMove="1" noResize="1" noEditPoints="1" noAdjustHandles="1" noChangeArrowheads="1" noChangeShapeType="1" noTextEdit="1"/>
+          </p:cNvSpPr>
+          <p:nvPr>
+            <p:extLst>
+              <p:ext uri="{386F3935-93C4-4BCD-93E2-E3B085C9AB24}">
+                <p16:designElem xmlns:p16="http://schemas.microsoft.com/office/powerpoint/2015/main" val="1"/>
+              </p:ext>
+            </p:extLst>
+          </p:nvPr>
+        </p:nvSpPr>
+        <p:spPr>
+          <a:xfrm>
+            <a:off x="7467712" y="0"/>
+            <a:ext cx="4319042" cy="6858000"/>
+          </a:xfrm>
+          <a:custGeom>
+            <a:avLst/>
+            <a:gdLst>
+              <a:gd name="connsiteX0" fmla="*/ 0 w 4319042"/>
+              <a:gd name="connsiteY0" fmla="*/ 0 h 6858000"/>
+              <a:gd name="connsiteX1" fmla="*/ 1142888 w 4319042"/>
+              <a:gd name="connsiteY1" fmla="*/ 0 h 6858000"/>
+              <a:gd name="connsiteX2" fmla="*/ 4319042 w 4319042"/>
+              <a:gd name="connsiteY2" fmla="*/ 6858000 h 6858000"/>
+              <a:gd name="connsiteX3" fmla="*/ 0 w 4319042"/>
+              <a:gd name="connsiteY3" fmla="*/ 6858000 h 6858000"/>
+            </a:gdLst>
+            <a:ahLst/>
+            <a:cxnLst>
+              <a:cxn ang="0">
+                <a:pos x="connsiteX0" y="connsiteY0"/>
+              </a:cxn>
+              <a:cxn ang="0">
+                <a:pos x="connsiteX1" y="connsiteY1"/>
+              </a:cxn>
+              <a:cxn ang="0">
+                <a:pos x="connsiteX2" y="connsiteY2"/>
+              </a:cxn>
+              <a:cxn ang="0">
+                <a:pos x="connsiteX3" y="connsiteY3"/>
+              </a:cxn>
+            </a:cxnLst>
+            <a:rect l="l" t="t" r="r" b="b"/>
+            <a:pathLst>
+              <a:path w="4319042" h="6858000">
+                <a:moveTo>
+                  <a:pt x="0" y="0"/>
+                </a:moveTo>
+                <a:lnTo>
+                  <a:pt x="1142888" y="0"/>
+                </a:lnTo>
+                <a:lnTo>
+                  <a:pt x="4319042" y="6858000"/>
+                </a:lnTo>
+                <a:lnTo>
+                  <a:pt x="0" y="6858000"/>
+                </a:lnTo>
+                <a:close/>
+              </a:path>
+            </a:pathLst>
+          </a:custGeom>
+          <a:solidFill>
+            <a:schemeClr val="tx1">
+              <a:alpha val="35000"/>
+            </a:schemeClr>
+          </a:solidFill>
+          <a:ln>
+            <a:noFill/>
+          </a:ln>
+        </p:spPr>
+        <p:style>
+          <a:lnRef idx="2">
+            <a:schemeClr val="accent1">
+              <a:shade val="50000"/>
+            </a:schemeClr>
+          </a:lnRef>
+          <a:fillRef idx="1">
+            <a:schemeClr val="accent1"/>
+          </a:fillRef>
+          <a:effectRef idx="0">
+            <a:schemeClr val="accent1"/>
+          </a:effectRef>
+          <a:fontRef idx="minor">
+            <a:schemeClr val="lt1"/>
+          </a:fontRef>
+        </p:style>
+        <p:txBody>
+          <a:bodyPr wrap="square" rtlCol="0" anchor="ctr">
+            <a:noAutofit/>
+          </a:bodyPr>
+          <a:lstStyle/>
+          <a:p>
+            <a:pPr algn="ctr"/>
+            <a:endParaRPr lang="en-US"/>
           </a:p>
         </p:txBody>
       </p:sp>
@@ -3071,14 +3142,207 @@
         </p:blipFill>
         <p:spPr>
           <a:xfrm>
-            <a:off x="3229333" y="383902"/>
-            <a:ext cx="5733333" cy="3509963"/>
+            <a:off x="643467" y="1280054"/>
+            <a:ext cx="6274296" cy="4297892"/>
           </a:xfrm>
           <a:prstGeom prst="rect">
             <a:avLst/>
           </a:prstGeom>
         </p:spPr>
       </p:pic>
+      <p:sp>
+        <p:nvSpPr>
+          <p:cNvPr id="3" name="Subtitle 2"/>
+          <p:cNvSpPr>
+            <a:spLocks noGrp="1"/>
+          </p:cNvSpPr>
+          <p:nvPr>
+            <p:ph type="subTitle" idx="1"/>
+          </p:nvPr>
+        </p:nvSpPr>
+        <p:spPr>
+          <a:xfrm>
+            <a:off x="8175790" y="2331180"/>
+            <a:ext cx="3308131" cy="2728912"/>
+          </a:xfrm>
+        </p:spPr>
+        <p:txBody>
+          <a:bodyPr>
+            <a:noAutofit/>
+          </a:bodyPr>
+          <a:lstStyle/>
+          <a:p>
+            <a:pPr algn="l"/>
+            <a:r>
+              <a:rPr lang="en-US" sz="3000" dirty="0">
+                <a:solidFill>
+                  <a:schemeClr val="bg1"/>
+                </a:solidFill>
+                <a:latin typeface="Batang" panose="02030600000101010101" pitchFamily="18" charset="-127"/>
+                <a:ea typeface="Batang" panose="02030600000101010101" pitchFamily="18" charset="-127"/>
+              </a:rPr>
+              <a:t>Lucas </a:t>
+            </a:r>
+            <a:r>
+              <a:rPr lang="en-US" sz="3000" dirty="0" err="1">
+                <a:solidFill>
+                  <a:schemeClr val="bg1"/>
+                </a:solidFill>
+                <a:latin typeface="Batang" panose="02030600000101010101" pitchFamily="18" charset="-127"/>
+                <a:ea typeface="Batang" panose="02030600000101010101" pitchFamily="18" charset="-127"/>
+              </a:rPr>
+              <a:t>Dachman</a:t>
+            </a:r>
+            <a:endParaRPr lang="en-US" sz="3000" dirty="0">
+              <a:solidFill>
+                <a:schemeClr val="bg1"/>
+              </a:solidFill>
+              <a:latin typeface="Batang" panose="02030600000101010101" pitchFamily="18" charset="-127"/>
+              <a:ea typeface="Batang" panose="02030600000101010101" pitchFamily="18" charset="-127"/>
+            </a:endParaRPr>
+          </a:p>
+          <a:p>
+            <a:pPr algn="l"/>
+            <a:r>
+              <a:rPr lang="en-US" sz="3000" dirty="0">
+                <a:solidFill>
+                  <a:schemeClr val="bg1"/>
+                </a:solidFill>
+                <a:latin typeface="Batang" panose="02030600000101010101" pitchFamily="18" charset="-127"/>
+                <a:ea typeface="Batang" panose="02030600000101010101" pitchFamily="18" charset="-127"/>
+              </a:rPr>
+              <a:t>Jasmine </a:t>
+            </a:r>
+            <a:r>
+              <a:rPr lang="en-US" sz="3000" dirty="0" err="1">
+                <a:solidFill>
+                  <a:schemeClr val="bg1"/>
+                </a:solidFill>
+                <a:latin typeface="Batang" panose="02030600000101010101" pitchFamily="18" charset="-127"/>
+                <a:ea typeface="Batang" panose="02030600000101010101" pitchFamily="18" charset="-127"/>
+              </a:rPr>
+              <a:t>Rethmann</a:t>
+            </a:r>
+            <a:endParaRPr lang="en-US" sz="3000" dirty="0">
+              <a:solidFill>
+                <a:schemeClr val="bg1"/>
+              </a:solidFill>
+              <a:latin typeface="Batang" panose="02030600000101010101" pitchFamily="18" charset="-127"/>
+              <a:ea typeface="Batang" panose="02030600000101010101" pitchFamily="18" charset="-127"/>
+            </a:endParaRPr>
+          </a:p>
+          <a:p>
+            <a:pPr algn="l"/>
+            <a:r>
+              <a:rPr lang="en-US" sz="3000" dirty="0" err="1">
+                <a:solidFill>
+                  <a:schemeClr val="bg1"/>
+                </a:solidFill>
+                <a:latin typeface="Batang" panose="02030600000101010101" pitchFamily="18" charset="-127"/>
+                <a:ea typeface="Batang" panose="02030600000101010101" pitchFamily="18" charset="-127"/>
+              </a:rPr>
+              <a:t>Nihar</a:t>
+            </a:r>
+            <a:r>
+              <a:rPr lang="en-US" sz="3000" dirty="0">
+                <a:solidFill>
+                  <a:schemeClr val="bg1"/>
+                </a:solidFill>
+                <a:latin typeface="Batang" panose="02030600000101010101" pitchFamily="18" charset="-127"/>
+                <a:ea typeface="Batang" panose="02030600000101010101" pitchFamily="18" charset="-127"/>
+              </a:rPr>
+              <a:t> </a:t>
+            </a:r>
+            <a:r>
+              <a:rPr lang="en-US" sz="3000" dirty="0" err="1">
+                <a:solidFill>
+                  <a:schemeClr val="bg1"/>
+                </a:solidFill>
+                <a:latin typeface="Batang" panose="02030600000101010101" pitchFamily="18" charset="-127"/>
+                <a:ea typeface="Batang" panose="02030600000101010101" pitchFamily="18" charset="-127"/>
+              </a:rPr>
+              <a:t>Nandan</a:t>
+            </a:r>
+            <a:endParaRPr lang="en-US" sz="3000" dirty="0">
+              <a:solidFill>
+                <a:schemeClr val="bg1"/>
+              </a:solidFill>
+              <a:latin typeface="Batang" panose="02030600000101010101" pitchFamily="18" charset="-127"/>
+              <a:ea typeface="Batang" panose="02030600000101010101" pitchFamily="18" charset="-127"/>
+            </a:endParaRPr>
+          </a:p>
+          <a:p>
+            <a:pPr algn="l"/>
+            <a:r>
+              <a:rPr lang="en-US" sz="3000" dirty="0">
+                <a:solidFill>
+                  <a:schemeClr val="bg1"/>
+                </a:solidFill>
+                <a:latin typeface="Batang" panose="02030600000101010101" pitchFamily="18" charset="-127"/>
+                <a:ea typeface="Batang" panose="02030600000101010101" pitchFamily="18" charset="-127"/>
+              </a:rPr>
+              <a:t>Jonathan </a:t>
+            </a:r>
+            <a:r>
+              <a:rPr lang="en-US" sz="3000" dirty="0" err="1">
+                <a:solidFill>
+                  <a:schemeClr val="bg1"/>
+                </a:solidFill>
+                <a:latin typeface="Batang" panose="02030600000101010101" pitchFamily="18" charset="-127"/>
+                <a:ea typeface="Batang" panose="02030600000101010101" pitchFamily="18" charset="-127"/>
+              </a:rPr>
+              <a:t>Taing</a:t>
+            </a:r>
+            <a:endParaRPr lang="en-US" sz="3000" dirty="0">
+              <a:solidFill>
+                <a:schemeClr val="bg1"/>
+              </a:solidFill>
+              <a:latin typeface="Batang" panose="02030600000101010101" pitchFamily="18" charset="-127"/>
+              <a:ea typeface="Batang" panose="02030600000101010101" pitchFamily="18" charset="-127"/>
+            </a:endParaRPr>
+          </a:p>
+          <a:p>
+            <a:pPr algn="l"/>
+            <a:r>
+              <a:rPr lang="en-US" sz="3000" dirty="0" err="1">
+                <a:solidFill>
+                  <a:schemeClr val="bg1"/>
+                </a:solidFill>
+                <a:latin typeface="Batang" panose="02030600000101010101" pitchFamily="18" charset="-127"/>
+                <a:ea typeface="Batang" panose="02030600000101010101" pitchFamily="18" charset="-127"/>
+              </a:rPr>
+              <a:t>Ningtian</a:t>
+            </a:r>
+            <a:r>
+              <a:rPr lang="en-US" sz="3000" dirty="0">
+                <a:solidFill>
+                  <a:schemeClr val="bg1"/>
+                </a:solidFill>
+                <a:latin typeface="Batang" panose="02030600000101010101" pitchFamily="18" charset="-127"/>
+                <a:ea typeface="Batang" panose="02030600000101010101" pitchFamily="18" charset="-127"/>
+              </a:rPr>
+              <a:t> </a:t>
+            </a:r>
+            <a:r>
+              <a:rPr lang="en-US" sz="3000" dirty="0" err="1">
+                <a:solidFill>
+                  <a:schemeClr val="bg1"/>
+                </a:solidFill>
+                <a:latin typeface="Batang" panose="02030600000101010101" pitchFamily="18" charset="-127"/>
+                <a:ea typeface="Batang" panose="02030600000101010101" pitchFamily="18" charset="-127"/>
+              </a:rPr>
+              <a:t>Ruan</a:t>
+            </a:r>
+            <a:endParaRPr lang="en-US" sz="3000" dirty="0">
+              <a:solidFill>
+                <a:schemeClr val="bg1"/>
+              </a:solidFill>
+              <a:latin typeface="Batang" panose="02030600000101010101" pitchFamily="18" charset="-127"/>
+              <a:ea typeface="Batang" panose="02030600000101010101" pitchFamily="18" charset="-127"/>
+            </a:endParaRPr>
+          </a:p>
+        </p:txBody>
+      </p:sp>
     </p:spTree>
     <p:extLst>
       <p:ext uri="{BB962C8B-B14F-4D97-AF65-F5344CB8AC3E}">
@@ -3092,7 +3356,7 @@
 </p:sld>
 </file>
 
-<file path=ppt/slides/slide2.xml><?xml version="1.0" encoding="utf-8"?>
+<file path=ppt/slides/slide10.xml><?xml version="1.0" encoding="utf-8"?>
 <p:sld xmlns:a="http://schemas.openxmlformats.org/drawingml/2006/main" xmlns:r="http://schemas.openxmlformats.org/officeDocument/2006/relationships" xmlns:p="http://schemas.openxmlformats.org/presentationml/2006/main">
   <p:cSld>
     <p:spTree>
@@ -3111,6 +3375,130 @@
       </p:grpSpPr>
       <p:sp>
         <p:nvSpPr>
+          <p:cNvPr id="12" name="Rectangle 11"/>
+          <p:cNvSpPr>
+            <a:spLocks noGrp="1" noRot="1" noChangeAspect="1" noMove="1" noResize="1" noEditPoints="1" noAdjustHandles="1" noChangeArrowheads="1" noChangeShapeType="1" noTextEdit="1"/>
+          </p:cNvSpPr>
+          <p:nvPr>
+            <p:extLst>
+              <p:ext uri="{386F3935-93C4-4BCD-93E2-E3B085C9AB24}">
+                <p16:designElem xmlns:p16="http://schemas.microsoft.com/office/powerpoint/2015/main" val="1"/>
+              </p:ext>
+            </p:extLst>
+          </p:nvPr>
+        </p:nvSpPr>
+        <p:spPr bwMode="white">
+          <a:xfrm>
+            <a:off x="0" y="0"/>
+            <a:ext cx="12192000" cy="6858000"/>
+          </a:xfrm>
+          <a:prstGeom prst="rect">
+            <a:avLst/>
+          </a:prstGeom>
+          <a:solidFill>
+            <a:schemeClr val="bg1"/>
+          </a:solidFill>
+          <a:ln>
+            <a:noFill/>
+          </a:ln>
+          <a:effectLst/>
+        </p:spPr>
+      </p:sp>
+      <p:sp>
+        <p:nvSpPr>
+          <p:cNvPr id="14" name="Rectangle 13"/>
+          <p:cNvSpPr>
+            <a:spLocks noGrp="1" noRot="1" noChangeAspect="1" noMove="1" noResize="1" noEditPoints="1" noAdjustHandles="1" noChangeArrowheads="1" noChangeShapeType="1" noTextEdit="1"/>
+          </p:cNvSpPr>
+          <p:nvPr>
+            <p:extLst>
+              <p:ext uri="{386F3935-93C4-4BCD-93E2-E3B085C9AB24}">
+                <p16:designElem xmlns:p16="http://schemas.microsoft.com/office/powerpoint/2015/main" val="1"/>
+              </p:ext>
+            </p:extLst>
+          </p:nvPr>
+        </p:nvSpPr>
+        <p:spPr>
+          <a:xfrm>
+            <a:off x="0" y="2"/>
+            <a:ext cx="4636008" cy="6857998"/>
+          </a:xfrm>
+          <a:prstGeom prst="rect">
+            <a:avLst/>
+          </a:prstGeom>
+          <a:solidFill>
+            <a:schemeClr val="tx1">
+              <a:lumMod val="85000"/>
+              <a:lumOff val="15000"/>
+            </a:schemeClr>
+          </a:solidFill>
+          <a:ln>
+            <a:noFill/>
+          </a:ln>
+          <a:effectLst/>
+        </p:spPr>
+        <p:style>
+          <a:lnRef idx="1">
+            <a:schemeClr val="accent1"/>
+          </a:lnRef>
+          <a:fillRef idx="3">
+            <a:schemeClr val="accent1"/>
+          </a:fillRef>
+          <a:effectRef idx="2">
+            <a:schemeClr val="accent1"/>
+          </a:effectRef>
+          <a:fontRef idx="minor">
+            <a:schemeClr val="lt1"/>
+          </a:fontRef>
+        </p:style>
+        <p:txBody>
+          <a:bodyPr rtlCol="0" anchor="ctr"/>
+          <a:lstStyle/>
+          <a:p>
+            <a:pPr algn="ctr" defTabSz="457200"/>
+            <a:endParaRPr lang="en-US">
+              <a:solidFill>
+                <a:srgbClr val="FFFFFF"/>
+              </a:solidFill>
+              <a:latin typeface="Calibri" panose="020F0502020204030204"/>
+            </a:endParaRPr>
+          </a:p>
+        </p:txBody>
+      </p:sp>
+      <p:pic>
+        <p:nvPicPr>
+          <p:cNvPr id="7" name="Picture Placeholder 6"/>
+          <p:cNvPicPr>
+            <a:picLocks noGrp="1" noChangeAspect="1"/>
+          </p:cNvPicPr>
+          <p:nvPr>
+            <p:ph type="pic" idx="1"/>
+          </p:nvPr>
+        </p:nvPicPr>
+        <p:blipFill rotWithShape="1">
+          <a:blip r:embed="rId2">
+            <a:extLst>
+              <a:ext uri="{28A0092B-C50C-407E-A947-70E740481C1C}">
+                <a14:useLocalDpi xmlns:a14="http://schemas.microsoft.com/office/drawing/2010/main" val="0"/>
+              </a:ext>
+            </a:extLst>
+          </a:blip>
+          <a:srcRect t="10396" r="-3" b="-3"/>
+          <a:stretch/>
+        </p:blipFill>
+        <p:spPr>
+          <a:xfrm>
+            <a:off x="651795" y="1536484"/>
+            <a:ext cx="3365600" cy="2931795"/>
+          </a:xfrm>
+          <a:prstGeom prst="rect">
+            <a:avLst/>
+          </a:prstGeom>
+          <a:effectLst/>
+        </p:spPr>
+      </p:pic>
+      <p:sp>
+        <p:nvSpPr>
           <p:cNvPr id="2" name="Title 1"/>
           <p:cNvSpPr>
             <a:spLocks noGrp="1"/>
@@ -3119,47 +3507,1772 @@
             <p:ph type="title"/>
           </p:nvPr>
         </p:nvSpPr>
-        <p:spPr/>
-        <p:txBody>
-          <a:bodyPr/>
-          <a:lstStyle/>
-          <a:p>
-            <a:r>
-              <a:rPr lang="en-US" dirty="0">
+        <p:spPr>
+          <a:xfrm>
+            <a:off x="501075" y="0"/>
+            <a:ext cx="3667039" cy="1676603"/>
+          </a:xfrm>
+        </p:spPr>
+        <p:txBody>
+          <a:bodyPr vert="horz" lIns="91440" tIns="45720" rIns="91440" bIns="45720" rtlCol="0" anchor="ctr">
+            <a:normAutofit/>
+          </a:bodyPr>
+          <a:lstStyle/>
+          <a:p>
+            <a:pPr algn="ctr"/>
+            <a:r>
+              <a:rPr lang="en-US" sz="3600" dirty="0">
                 <a:solidFill>
-                  <a:schemeClr val="accent6"/>
+                  <a:schemeClr val="bg1"/>
                 </a:solidFill>
                 <a:latin typeface="Elephant" panose="02020904090505020303" pitchFamily="18" charset="0"/>
               </a:rPr>
+              <a:t>Auto-</a:t>
+            </a:r>
+            <a:r>
+              <a:rPr lang="en-US" sz="3600" dirty="0" err="1">
+                <a:solidFill>
+                  <a:schemeClr val="bg1"/>
+                </a:solidFill>
+                <a:latin typeface="Elephant" panose="02020904090505020303" pitchFamily="18" charset="0"/>
+              </a:rPr>
+              <a:t>Documentor</a:t>
+            </a:r>
+            <a:endParaRPr lang="en-US" sz="3600" dirty="0">
+              <a:solidFill>
+                <a:schemeClr val="bg1"/>
+              </a:solidFill>
+              <a:latin typeface="Elephant" panose="02020904090505020303" pitchFamily="18" charset="0"/>
+            </a:endParaRPr>
+          </a:p>
+        </p:txBody>
+      </p:sp>
+      <p:sp>
+        <p:nvSpPr>
+          <p:cNvPr id="4" name="Text Placeholder 3"/>
+          <p:cNvSpPr>
+            <a:spLocks noGrp="1"/>
+          </p:cNvSpPr>
+          <p:nvPr>
+            <p:ph type="body" sz="half" idx="2"/>
+          </p:nvPr>
+        </p:nvSpPr>
+        <p:spPr>
+          <a:xfrm>
+            <a:off x="484486" y="4837383"/>
+            <a:ext cx="3667036" cy="3779520"/>
+          </a:xfrm>
+        </p:spPr>
+        <p:txBody>
+          <a:bodyPr vert="horz" lIns="91440" tIns="45720" rIns="91440" bIns="45720" rtlCol="0">
+            <a:normAutofit/>
+          </a:bodyPr>
+          <a:lstStyle/>
+          <a:p>
+            <a:pPr algn="ctr"/>
+            <a:r>
+              <a:rPr lang="en-US" sz="2400" dirty="0">
+                <a:solidFill>
+                  <a:schemeClr val="bg1"/>
+                </a:solidFill>
+                <a:latin typeface="Batang" panose="02030600000101010101" pitchFamily="18" charset="-127"/>
+                <a:ea typeface="Batang" panose="02030600000101010101" pitchFamily="18" charset="-127"/>
+              </a:rPr>
+              <a:t>Purpose: To gather all comments and summaries of code</a:t>
+            </a:r>
+          </a:p>
+          <a:p>
+            <a:pPr algn="ctr"/>
+            <a:r>
+              <a:rPr lang="en-US" sz="6000" dirty="0">
+                <a:solidFill>
+                  <a:srgbClr val="FF0000"/>
+                </a:solidFill>
+                <a:latin typeface="Batang" panose="02030600000101010101" pitchFamily="18" charset="-127"/>
+                <a:ea typeface="Batang" panose="02030600000101010101" pitchFamily="18" charset="-127"/>
+              </a:rPr>
+              <a:t>5</a:t>
+            </a:r>
+          </a:p>
+        </p:txBody>
+      </p:sp>
+      <p:pic>
+        <p:nvPicPr>
+          <p:cNvPr id="3" name="Picture 2"/>
+          <p:cNvPicPr>
+            <a:picLocks noChangeAspect="1"/>
+          </p:cNvPicPr>
+          <p:nvPr/>
+        </p:nvPicPr>
+        <p:blipFill>
+          <a:blip r:embed="rId3">
+            <a:extLst>
+              <a:ext uri="{28A0092B-C50C-407E-A947-70E740481C1C}">
+                <a14:useLocalDpi xmlns:a14="http://schemas.microsoft.com/office/drawing/2010/main" val="0"/>
+              </a:ext>
+            </a:extLst>
+          </a:blip>
+          <a:stretch>
+            <a:fillRect/>
+          </a:stretch>
+        </p:blipFill>
+        <p:spPr>
+          <a:xfrm>
+            <a:off x="4708262" y="1123628"/>
+            <a:ext cx="7411484" cy="4610743"/>
+          </a:xfrm>
+          <a:prstGeom prst="rect">
+            <a:avLst/>
+          </a:prstGeom>
+        </p:spPr>
+      </p:pic>
+    </p:spTree>
+    <p:extLst>
+      <p:ext uri="{BB962C8B-B14F-4D97-AF65-F5344CB8AC3E}">
+        <p14:creationId xmlns:p14="http://schemas.microsoft.com/office/powerpoint/2010/main" val="256193105"/>
+      </p:ext>
+    </p:extLst>
+  </p:cSld>
+  <p:clrMapOvr>
+    <a:masterClrMapping/>
+  </p:clrMapOvr>
+</p:sld>
+</file>
+
+<file path=ppt/slides/slide11.xml><?xml version="1.0" encoding="utf-8"?>
+<p:sld xmlns:a="http://schemas.openxmlformats.org/drawingml/2006/main" xmlns:r="http://schemas.openxmlformats.org/officeDocument/2006/relationships" xmlns:p="http://schemas.openxmlformats.org/presentationml/2006/main">
+  <p:cSld>
+    <p:spTree>
+      <p:nvGrpSpPr>
+        <p:cNvPr id="1" name=""/>
+        <p:cNvGrpSpPr/>
+        <p:nvPr/>
+      </p:nvGrpSpPr>
+      <p:grpSpPr>
+        <a:xfrm>
+          <a:off x="0" y="0"/>
+          <a:ext cx="0" cy="0"/>
+          <a:chOff x="0" y="0"/>
+          <a:chExt cx="0" cy="0"/>
+        </a:xfrm>
+      </p:grpSpPr>
+      <p:sp>
+        <p:nvSpPr>
+          <p:cNvPr id="12" name="Rectangle 11"/>
+          <p:cNvSpPr>
+            <a:spLocks noGrp="1" noRot="1" noChangeAspect="1" noMove="1" noResize="1" noEditPoints="1" noAdjustHandles="1" noChangeArrowheads="1" noChangeShapeType="1" noTextEdit="1"/>
+          </p:cNvSpPr>
+          <p:nvPr>
+            <p:extLst>
+              <p:ext uri="{386F3935-93C4-4BCD-93E2-E3B085C9AB24}">
+                <p16:designElem xmlns:p16="http://schemas.microsoft.com/office/powerpoint/2015/main" val="1"/>
+              </p:ext>
+            </p:extLst>
+          </p:nvPr>
+        </p:nvSpPr>
+        <p:spPr bwMode="white">
+          <a:xfrm>
+            <a:off x="0" y="0"/>
+            <a:ext cx="12192000" cy="6858000"/>
+          </a:xfrm>
+          <a:prstGeom prst="rect">
+            <a:avLst/>
+          </a:prstGeom>
+          <a:solidFill>
+            <a:schemeClr val="bg1"/>
+          </a:solidFill>
+          <a:ln>
+            <a:noFill/>
+          </a:ln>
+          <a:effectLst/>
+        </p:spPr>
+      </p:sp>
+      <p:sp>
+        <p:nvSpPr>
+          <p:cNvPr id="14" name="Rectangle 13"/>
+          <p:cNvSpPr>
+            <a:spLocks noGrp="1" noRot="1" noChangeAspect="1" noMove="1" noResize="1" noEditPoints="1" noAdjustHandles="1" noChangeArrowheads="1" noChangeShapeType="1" noTextEdit="1"/>
+          </p:cNvSpPr>
+          <p:nvPr>
+            <p:extLst>
+              <p:ext uri="{386F3935-93C4-4BCD-93E2-E3B085C9AB24}">
+                <p16:designElem xmlns:p16="http://schemas.microsoft.com/office/powerpoint/2015/main" val="1"/>
+              </p:ext>
+            </p:extLst>
+          </p:nvPr>
+        </p:nvSpPr>
+        <p:spPr>
+          <a:xfrm>
+            <a:off x="0" y="2"/>
+            <a:ext cx="4636008" cy="6857998"/>
+          </a:xfrm>
+          <a:prstGeom prst="rect">
+            <a:avLst/>
+          </a:prstGeom>
+          <a:solidFill>
+            <a:schemeClr val="tx1">
+              <a:lumMod val="85000"/>
+              <a:lumOff val="15000"/>
+            </a:schemeClr>
+          </a:solidFill>
+          <a:ln>
+            <a:noFill/>
+          </a:ln>
+          <a:effectLst/>
+        </p:spPr>
+        <p:style>
+          <a:lnRef idx="1">
+            <a:schemeClr val="accent1"/>
+          </a:lnRef>
+          <a:fillRef idx="3">
+            <a:schemeClr val="accent1"/>
+          </a:fillRef>
+          <a:effectRef idx="2">
+            <a:schemeClr val="accent1"/>
+          </a:effectRef>
+          <a:fontRef idx="minor">
+            <a:schemeClr val="lt1"/>
+          </a:fontRef>
+        </p:style>
+        <p:txBody>
+          <a:bodyPr rtlCol="0" anchor="ctr"/>
+          <a:lstStyle/>
+          <a:p>
+            <a:pPr algn="ctr" defTabSz="457200"/>
+            <a:endParaRPr lang="en-US">
+              <a:solidFill>
+                <a:srgbClr val="FFFFFF"/>
+              </a:solidFill>
+              <a:latin typeface="Calibri" panose="020F0502020204030204"/>
+            </a:endParaRPr>
+          </a:p>
+        </p:txBody>
+      </p:sp>
+      <p:sp>
+        <p:nvSpPr>
+          <p:cNvPr id="2" name="Title 1"/>
+          <p:cNvSpPr>
+            <a:spLocks noGrp="1"/>
+          </p:cNvSpPr>
+          <p:nvPr>
+            <p:ph type="title"/>
+          </p:nvPr>
+        </p:nvSpPr>
+        <p:spPr>
+          <a:xfrm>
+            <a:off x="501075" y="0"/>
+            <a:ext cx="3667039" cy="1676603"/>
+          </a:xfrm>
+        </p:spPr>
+        <p:txBody>
+          <a:bodyPr vert="horz" lIns="91440" tIns="45720" rIns="91440" bIns="45720" rtlCol="0" anchor="ctr">
+            <a:normAutofit/>
+          </a:bodyPr>
+          <a:lstStyle/>
+          <a:p>
+            <a:pPr algn="ctr"/>
+            <a:r>
+              <a:rPr lang="en-US" sz="3600" dirty="0">
+                <a:solidFill>
+                  <a:schemeClr val="bg1"/>
+                </a:solidFill>
+                <a:latin typeface="Elephant" panose="02020904090505020303" pitchFamily="18" charset="0"/>
+              </a:rPr>
+              <a:t>Deployment Environment</a:t>
+            </a:r>
+          </a:p>
+        </p:txBody>
+      </p:sp>
+      <p:sp>
+        <p:nvSpPr>
+          <p:cNvPr id="4" name="Text Placeholder 3"/>
+          <p:cNvSpPr>
+            <a:spLocks noGrp="1"/>
+          </p:cNvSpPr>
+          <p:nvPr>
+            <p:ph type="body" sz="half" idx="2"/>
+          </p:nvPr>
+        </p:nvSpPr>
+        <p:spPr>
+          <a:xfrm>
+            <a:off x="484486" y="4614962"/>
+            <a:ext cx="3667036" cy="3779520"/>
+          </a:xfrm>
+        </p:spPr>
+        <p:txBody>
+          <a:bodyPr vert="horz" lIns="91440" tIns="45720" rIns="91440" bIns="45720" rtlCol="0">
+            <a:normAutofit/>
+          </a:bodyPr>
+          <a:lstStyle/>
+          <a:p>
+            <a:pPr algn="ctr"/>
+            <a:r>
+              <a:rPr lang="en-US" sz="2400" dirty="0">
+                <a:solidFill>
+                  <a:schemeClr val="bg1"/>
+                </a:solidFill>
+                <a:latin typeface="Batang" panose="02030600000101010101" pitchFamily="18" charset="-127"/>
+                <a:ea typeface="Batang" panose="02030600000101010101" pitchFamily="18" charset="-127"/>
+              </a:rPr>
+              <a:t>Purpose: To test and run the app</a:t>
+            </a:r>
+          </a:p>
+          <a:p>
+            <a:pPr algn="ctr"/>
+            <a:r>
+              <a:rPr lang="en-US" sz="6000" dirty="0">
+                <a:solidFill>
+                  <a:srgbClr val="FF0000"/>
+                </a:solidFill>
+                <a:latin typeface="Batang" panose="02030600000101010101" pitchFamily="18" charset="-127"/>
+                <a:ea typeface="Batang" panose="02030600000101010101" pitchFamily="18" charset="-127"/>
+              </a:rPr>
+              <a:t>4</a:t>
+            </a:r>
+          </a:p>
+        </p:txBody>
+      </p:sp>
+      <p:sp>
+        <p:nvSpPr>
+          <p:cNvPr id="3" name="Picture Placeholder 2"/>
+          <p:cNvSpPr>
+            <a:spLocks noGrp="1"/>
+          </p:cNvSpPr>
+          <p:nvPr>
+            <p:ph type="pic" idx="1"/>
+          </p:nvPr>
+        </p:nvSpPr>
+        <p:spPr/>
+      </p:sp>
+    </p:spTree>
+    <p:extLst>
+      <p:ext uri="{BB962C8B-B14F-4D97-AF65-F5344CB8AC3E}">
+        <p14:creationId xmlns:p14="http://schemas.microsoft.com/office/powerpoint/2010/main" val="1803584850"/>
+      </p:ext>
+    </p:extLst>
+  </p:cSld>
+  <p:clrMapOvr>
+    <a:masterClrMapping/>
+  </p:clrMapOvr>
+</p:sld>
+</file>
+
+<file path=ppt/slides/slide12.xml><?xml version="1.0" encoding="utf-8"?>
+<p:sld xmlns:a="http://schemas.openxmlformats.org/drawingml/2006/main" xmlns:r="http://schemas.openxmlformats.org/officeDocument/2006/relationships" xmlns:p="http://schemas.openxmlformats.org/presentationml/2006/main">
+  <p:cSld>
+    <p:spTree>
+      <p:nvGrpSpPr>
+        <p:cNvPr id="1" name=""/>
+        <p:cNvGrpSpPr/>
+        <p:nvPr/>
+      </p:nvGrpSpPr>
+      <p:grpSpPr>
+        <a:xfrm>
+          <a:off x="0" y="0"/>
+          <a:ext cx="0" cy="0"/>
+          <a:chOff x="0" y="0"/>
+          <a:chExt cx="0" cy="0"/>
+        </a:xfrm>
+      </p:grpSpPr>
+      <p:sp>
+        <p:nvSpPr>
+          <p:cNvPr id="12" name="Rectangle 11"/>
+          <p:cNvSpPr>
+            <a:spLocks noGrp="1" noRot="1" noChangeAspect="1" noMove="1" noResize="1" noEditPoints="1" noAdjustHandles="1" noChangeArrowheads="1" noChangeShapeType="1" noTextEdit="1"/>
+          </p:cNvSpPr>
+          <p:nvPr>
+            <p:extLst>
+              <p:ext uri="{386F3935-93C4-4BCD-93E2-E3B085C9AB24}">
+                <p16:designElem xmlns:p16="http://schemas.microsoft.com/office/powerpoint/2015/main" val="1"/>
+              </p:ext>
+            </p:extLst>
+          </p:nvPr>
+        </p:nvSpPr>
+        <p:spPr bwMode="white">
+          <a:xfrm>
+            <a:off x="0" y="0"/>
+            <a:ext cx="12192000" cy="6858000"/>
+          </a:xfrm>
+          <a:prstGeom prst="rect">
+            <a:avLst/>
+          </a:prstGeom>
+          <a:solidFill>
+            <a:schemeClr val="bg1"/>
+          </a:solidFill>
+          <a:ln>
+            <a:noFill/>
+          </a:ln>
+          <a:effectLst/>
+        </p:spPr>
+      </p:sp>
+      <p:sp>
+        <p:nvSpPr>
+          <p:cNvPr id="14" name="Rectangle 13"/>
+          <p:cNvSpPr>
+            <a:spLocks noGrp="1" noRot="1" noChangeAspect="1" noMove="1" noResize="1" noEditPoints="1" noAdjustHandles="1" noChangeArrowheads="1" noChangeShapeType="1" noTextEdit="1"/>
+          </p:cNvSpPr>
+          <p:nvPr>
+            <p:extLst>
+              <p:ext uri="{386F3935-93C4-4BCD-93E2-E3B085C9AB24}">
+                <p16:designElem xmlns:p16="http://schemas.microsoft.com/office/powerpoint/2015/main" val="1"/>
+              </p:ext>
+            </p:extLst>
+          </p:nvPr>
+        </p:nvSpPr>
+        <p:spPr>
+          <a:xfrm>
+            <a:off x="0" y="2"/>
+            <a:ext cx="4636008" cy="6857998"/>
+          </a:xfrm>
+          <a:prstGeom prst="rect">
+            <a:avLst/>
+          </a:prstGeom>
+          <a:solidFill>
+            <a:schemeClr val="tx1">
+              <a:lumMod val="85000"/>
+              <a:lumOff val="15000"/>
+            </a:schemeClr>
+          </a:solidFill>
+          <a:ln>
+            <a:noFill/>
+          </a:ln>
+          <a:effectLst/>
+        </p:spPr>
+        <p:style>
+          <a:lnRef idx="1">
+            <a:schemeClr val="accent1"/>
+          </a:lnRef>
+          <a:fillRef idx="3">
+            <a:schemeClr val="accent1"/>
+          </a:fillRef>
+          <a:effectRef idx="2">
+            <a:schemeClr val="accent1"/>
+          </a:effectRef>
+          <a:fontRef idx="minor">
+            <a:schemeClr val="lt1"/>
+          </a:fontRef>
+        </p:style>
+        <p:txBody>
+          <a:bodyPr rtlCol="0" anchor="ctr"/>
+          <a:lstStyle/>
+          <a:p>
+            <a:pPr algn="ctr" defTabSz="457200"/>
+            <a:endParaRPr lang="en-US">
+              <a:solidFill>
+                <a:srgbClr val="FFFFFF"/>
+              </a:solidFill>
+              <a:latin typeface="Calibri" panose="020F0502020204030204"/>
+            </a:endParaRPr>
+          </a:p>
+        </p:txBody>
+      </p:sp>
+      <p:sp>
+        <p:nvSpPr>
+          <p:cNvPr id="2" name="Title 1"/>
+          <p:cNvSpPr>
+            <a:spLocks noGrp="1"/>
+          </p:cNvSpPr>
+          <p:nvPr>
+            <p:ph type="title"/>
+          </p:nvPr>
+        </p:nvSpPr>
+        <p:spPr>
+          <a:xfrm>
+            <a:off x="501075" y="0"/>
+            <a:ext cx="3667039" cy="1676603"/>
+          </a:xfrm>
+        </p:spPr>
+        <p:txBody>
+          <a:bodyPr vert="horz" lIns="91440" tIns="45720" rIns="91440" bIns="45720" rtlCol="0" anchor="ctr">
+            <a:normAutofit/>
+          </a:bodyPr>
+          <a:lstStyle/>
+          <a:p>
+            <a:pPr algn="ctr"/>
+            <a:r>
+              <a:rPr lang="en-US" sz="3600" dirty="0">
+                <a:solidFill>
+                  <a:schemeClr val="bg1"/>
+                </a:solidFill>
+                <a:latin typeface="Elephant" panose="02020904090505020303" pitchFamily="18" charset="0"/>
+              </a:rPr>
+              <a:t>Framework</a:t>
+            </a:r>
+          </a:p>
+        </p:txBody>
+      </p:sp>
+      <p:sp>
+        <p:nvSpPr>
+          <p:cNvPr id="4" name="Text Placeholder 3"/>
+          <p:cNvSpPr>
+            <a:spLocks noGrp="1"/>
+          </p:cNvSpPr>
+          <p:nvPr>
+            <p:ph type="body" sz="half" idx="2"/>
+          </p:nvPr>
+        </p:nvSpPr>
+        <p:spPr>
+          <a:xfrm>
+            <a:off x="501075" y="4404897"/>
+            <a:ext cx="3667036" cy="3779520"/>
+          </a:xfrm>
+        </p:spPr>
+        <p:txBody>
+          <a:bodyPr vert="horz" lIns="91440" tIns="45720" rIns="91440" bIns="45720" rtlCol="0">
+            <a:normAutofit/>
+          </a:bodyPr>
+          <a:lstStyle/>
+          <a:p>
+            <a:pPr algn="ctr"/>
+            <a:r>
+              <a:rPr lang="en-US" sz="2400" dirty="0">
+                <a:solidFill>
+                  <a:schemeClr val="bg1"/>
+                </a:solidFill>
+                <a:latin typeface="Batang" panose="02030600000101010101" pitchFamily="18" charset="-127"/>
+                <a:ea typeface="Batang" panose="02030600000101010101" pitchFamily="18" charset="-127"/>
+              </a:rPr>
+              <a:t>Purpose: </a:t>
+            </a:r>
+          </a:p>
+          <a:p>
+            <a:pPr algn="ctr"/>
+            <a:r>
+              <a:rPr lang="en-US" sz="2400" dirty="0">
+                <a:solidFill>
+                  <a:schemeClr val="bg1"/>
+                </a:solidFill>
+                <a:latin typeface="Batang" panose="02030600000101010101" pitchFamily="18" charset="-127"/>
+                <a:ea typeface="Batang" panose="02030600000101010101" pitchFamily="18" charset="-127"/>
+              </a:rPr>
+              <a:t>We used this to develop the code needed for the app</a:t>
+            </a:r>
+          </a:p>
+          <a:p>
+            <a:pPr algn="ctr"/>
+            <a:r>
+              <a:rPr lang="en-US" sz="6000" dirty="0">
+                <a:solidFill>
+                  <a:srgbClr val="FF0000"/>
+                </a:solidFill>
+                <a:latin typeface="Batang" panose="02030600000101010101" pitchFamily="18" charset="-127"/>
+                <a:ea typeface="Batang" panose="02030600000101010101" pitchFamily="18" charset="-127"/>
+              </a:rPr>
+              <a:t>3</a:t>
+            </a:r>
+          </a:p>
+        </p:txBody>
+      </p:sp>
+      <p:pic>
+        <p:nvPicPr>
+          <p:cNvPr id="5" name="Picture Placeholder 4"/>
+          <p:cNvPicPr>
+            <a:picLocks noGrp="1" noChangeAspect="1"/>
+          </p:cNvPicPr>
+          <p:nvPr>
+            <p:ph type="pic" idx="1"/>
+          </p:nvPr>
+        </p:nvPicPr>
+        <p:blipFill>
+          <a:blip r:embed="rId2">
+            <a:extLst>
+              <a:ext uri="{28A0092B-C50C-407E-A947-70E740481C1C}">
+                <a14:useLocalDpi xmlns:a14="http://schemas.microsoft.com/office/drawing/2010/main" val="0"/>
+              </a:ext>
+            </a:extLst>
+          </a:blip>
+          <a:srcRect l="1268" r="1268"/>
+          <a:stretch>
+            <a:fillRect/>
+          </a:stretch>
+        </p:blipFill>
+        <p:spPr>
+          <a:xfrm>
+            <a:off x="840542" y="1483583"/>
+            <a:ext cx="2988104" cy="2524726"/>
+          </a:xfrm>
+        </p:spPr>
+      </p:pic>
+      <p:pic>
+        <p:nvPicPr>
+          <p:cNvPr id="6" name="Picture 5"/>
+          <p:cNvPicPr>
+            <a:picLocks noChangeAspect="1"/>
+          </p:cNvPicPr>
+          <p:nvPr/>
+        </p:nvPicPr>
+        <p:blipFill>
+          <a:blip r:embed="rId3">
+            <a:extLst>
+              <a:ext uri="{28A0092B-C50C-407E-A947-70E740481C1C}">
+                <a14:useLocalDpi xmlns:a14="http://schemas.microsoft.com/office/drawing/2010/main" val="0"/>
+              </a:ext>
+            </a:extLst>
+          </a:blip>
+          <a:stretch>
+            <a:fillRect/>
+          </a:stretch>
+        </p:blipFill>
+        <p:spPr>
+          <a:xfrm>
+            <a:off x="4786313" y="667629"/>
+            <a:ext cx="7300912" cy="5204534"/>
+          </a:xfrm>
+          <a:prstGeom prst="rect">
+            <a:avLst/>
+          </a:prstGeom>
+        </p:spPr>
+      </p:pic>
+    </p:spTree>
+    <p:extLst>
+      <p:ext uri="{BB962C8B-B14F-4D97-AF65-F5344CB8AC3E}">
+        <p14:creationId xmlns:p14="http://schemas.microsoft.com/office/powerpoint/2010/main" val="299814519"/>
+      </p:ext>
+    </p:extLst>
+  </p:cSld>
+  <p:clrMapOvr>
+    <a:masterClrMapping/>
+  </p:clrMapOvr>
+</p:sld>
+</file>
+
+<file path=ppt/slides/slide13.xml><?xml version="1.0" encoding="utf-8"?>
+<p:sld xmlns:a="http://schemas.openxmlformats.org/drawingml/2006/main" xmlns:r="http://schemas.openxmlformats.org/officeDocument/2006/relationships" xmlns:p="http://schemas.openxmlformats.org/presentationml/2006/main">
+  <p:cSld>
+    <p:spTree>
+      <p:nvGrpSpPr>
+        <p:cNvPr id="1" name=""/>
+        <p:cNvGrpSpPr/>
+        <p:nvPr/>
+      </p:nvGrpSpPr>
+      <p:grpSpPr>
+        <a:xfrm>
+          <a:off x="0" y="0"/>
+          <a:ext cx="0" cy="0"/>
+          <a:chOff x="0" y="0"/>
+          <a:chExt cx="0" cy="0"/>
+        </a:xfrm>
+      </p:grpSpPr>
+      <p:sp>
+        <p:nvSpPr>
+          <p:cNvPr id="7" name="Rectangle 6"/>
+          <p:cNvSpPr>
+            <a:spLocks noGrp="1" noRot="1" noChangeAspect="1" noMove="1" noResize="1" noEditPoints="1" noAdjustHandles="1" noChangeArrowheads="1" noChangeShapeType="1" noTextEdit="1"/>
+          </p:cNvSpPr>
+          <p:nvPr>
+            <p:extLst>
+              <p:ext uri="{386F3935-93C4-4BCD-93E2-E3B085C9AB24}">
+                <p16:designElem xmlns:p16="http://schemas.microsoft.com/office/powerpoint/2015/main" val="1"/>
+              </p:ext>
+            </p:extLst>
+          </p:nvPr>
+        </p:nvSpPr>
+        <p:spPr bwMode="white">
+          <a:xfrm>
+            <a:off x="0" y="0"/>
+            <a:ext cx="12192000" cy="6858000"/>
+          </a:xfrm>
+          <a:prstGeom prst="rect">
+            <a:avLst/>
+          </a:prstGeom>
+          <a:solidFill>
+            <a:schemeClr val="bg1"/>
+          </a:solidFill>
+          <a:ln>
+            <a:noFill/>
+          </a:ln>
+          <a:effectLst/>
+        </p:spPr>
+      </p:sp>
+      <p:sp>
+        <p:nvSpPr>
+          <p:cNvPr id="9" name="Rectangle 8"/>
+          <p:cNvSpPr>
+            <a:spLocks noGrp="1" noRot="1" noChangeAspect="1" noMove="1" noResize="1" noEditPoints="1" noAdjustHandles="1" noChangeArrowheads="1" noChangeShapeType="1" noTextEdit="1"/>
+          </p:cNvSpPr>
+          <p:nvPr>
+            <p:extLst>
+              <p:ext uri="{386F3935-93C4-4BCD-93E2-E3B085C9AB24}">
+                <p16:designElem xmlns:p16="http://schemas.microsoft.com/office/powerpoint/2015/main" val="1"/>
+              </p:ext>
+            </p:extLst>
+          </p:nvPr>
+        </p:nvSpPr>
+        <p:spPr bwMode="ltGray">
+          <a:xfrm>
+            <a:off x="321564" y="320040"/>
+            <a:ext cx="11548872" cy="6217920"/>
+          </a:xfrm>
+          <a:prstGeom prst="rect">
+            <a:avLst/>
+          </a:prstGeom>
+          <a:solidFill>
+            <a:schemeClr val="tx1">
+              <a:lumMod val="75000"/>
+              <a:lumOff val="25000"/>
+            </a:schemeClr>
+          </a:solidFill>
+          <a:ln w="127000" cap="sq" cmpd="thinThick">
+            <a:noFill/>
+          </a:ln>
+        </p:spPr>
+        <p:style>
+          <a:lnRef idx="2">
+            <a:schemeClr val="accent1">
+              <a:shade val="50000"/>
+            </a:schemeClr>
+          </a:lnRef>
+          <a:fillRef idx="1">
+            <a:schemeClr val="accent1"/>
+          </a:fillRef>
+          <a:effectRef idx="0">
+            <a:schemeClr val="accent1"/>
+          </a:effectRef>
+          <a:fontRef idx="minor">
+            <a:schemeClr val="lt1"/>
+          </a:fontRef>
+        </p:style>
+        <p:txBody>
+          <a:bodyPr rtlCol="0" anchor="ctr"/>
+          <a:lstStyle/>
+          <a:p>
+            <a:pPr algn="ctr"/>
+            <a:endParaRPr lang="en-US"/>
+          </a:p>
+        </p:txBody>
+      </p:sp>
+      <p:cxnSp>
+        <p:nvCxnSpPr>
+          <p:cNvPr id="11" name="Straight Connector 10"/>
+          <p:cNvCxnSpPr>
+            <a:cxnSpLocks noGrp="1" noRot="1" noChangeAspect="1" noMove="1" noResize="1" noEditPoints="1" noAdjustHandles="1" noChangeArrowheads="1" noChangeShapeType="1"/>
+          </p:cNvCxnSpPr>
+          <p:nvPr>
+            <p:extLst>
+              <p:ext uri="{386F3935-93C4-4BCD-93E2-E3B085C9AB24}">
+                <p16:designElem xmlns:p16="http://schemas.microsoft.com/office/powerpoint/2015/main" val="1"/>
+              </p:ext>
+            </p:extLst>
+          </p:nvPr>
+        </p:nvCxnSpPr>
+        <p:spPr>
+          <a:xfrm>
+            <a:off x="4055891" y="2057399"/>
+            <a:ext cx="0" cy="2743200"/>
+          </a:xfrm>
+          <a:prstGeom prst="line">
+            <a:avLst/>
+          </a:prstGeom>
+          <a:ln w="19050">
+            <a:solidFill>
+              <a:schemeClr val="bg1"/>
+            </a:solidFill>
+          </a:ln>
+        </p:spPr>
+        <p:style>
+          <a:lnRef idx="1">
+            <a:schemeClr val="accent1"/>
+          </a:lnRef>
+          <a:fillRef idx="0">
+            <a:schemeClr val="accent1"/>
+          </a:fillRef>
+          <a:effectRef idx="0">
+            <a:schemeClr val="accent1"/>
+          </a:effectRef>
+          <a:fontRef idx="minor">
+            <a:schemeClr val="tx1"/>
+          </a:fontRef>
+        </p:style>
+      </p:cxnSp>
+      <p:sp>
+        <p:nvSpPr>
+          <p:cNvPr id="2" name="Title 1"/>
+          <p:cNvSpPr>
+            <a:spLocks noGrp="1"/>
+          </p:cNvSpPr>
+          <p:nvPr>
+            <p:ph type="title"/>
+          </p:nvPr>
+        </p:nvSpPr>
+        <p:spPr>
+          <a:xfrm>
+            <a:off x="6523713" y="965198"/>
+            <a:ext cx="6766078" cy="4927601"/>
+          </a:xfrm>
+        </p:spPr>
+        <p:txBody>
+          <a:bodyPr vert="horz" lIns="91440" tIns="45720" rIns="91440" bIns="45720" rtlCol="0" anchor="ctr">
+            <a:normAutofit/>
+          </a:bodyPr>
+          <a:lstStyle/>
+          <a:p>
+            <a:r>
+              <a:rPr lang="en-US" sz="6000" dirty="0">
+                <a:solidFill>
+                  <a:schemeClr val="bg1"/>
+                </a:solidFill>
+                <a:latin typeface="Elephant" panose="02020904090505020303" pitchFamily="18" charset="0"/>
+              </a:rPr>
+              <a:t>Challenges</a:t>
+            </a:r>
+          </a:p>
+        </p:txBody>
+      </p:sp>
+    </p:spTree>
+    <p:extLst>
+      <p:ext uri="{BB962C8B-B14F-4D97-AF65-F5344CB8AC3E}">
+        <p14:creationId xmlns:p14="http://schemas.microsoft.com/office/powerpoint/2010/main" val="1602079093"/>
+      </p:ext>
+    </p:extLst>
+  </p:cSld>
+  <p:clrMapOvr>
+    <a:masterClrMapping/>
+  </p:clrMapOvr>
+</p:sld>
+</file>
+
+<file path=ppt/slides/slide14.xml><?xml version="1.0" encoding="utf-8"?>
+<p:sld xmlns:a="http://schemas.openxmlformats.org/drawingml/2006/main" xmlns:r="http://schemas.openxmlformats.org/officeDocument/2006/relationships" xmlns:p="http://schemas.openxmlformats.org/presentationml/2006/main">
+  <p:cSld>
+    <p:spTree>
+      <p:nvGrpSpPr>
+        <p:cNvPr id="1" name=""/>
+        <p:cNvGrpSpPr/>
+        <p:nvPr/>
+      </p:nvGrpSpPr>
+      <p:grpSpPr>
+        <a:xfrm>
+          <a:off x="0" y="0"/>
+          <a:ext cx="0" cy="0"/>
+          <a:chOff x="0" y="0"/>
+          <a:chExt cx="0" cy="0"/>
+        </a:xfrm>
+      </p:grpSpPr>
+      <p:sp>
+        <p:nvSpPr>
+          <p:cNvPr id="8" name="Rectangle 7"/>
+          <p:cNvSpPr>
+            <a:spLocks noGrp="1" noRot="1" noChangeAspect="1" noMove="1" noResize="1" noEditPoints="1" noAdjustHandles="1" noChangeArrowheads="1" noChangeShapeType="1" noTextEdit="1"/>
+          </p:cNvSpPr>
+          <p:nvPr>
+            <p:extLst>
+              <p:ext uri="{386F3935-93C4-4BCD-93E2-E3B085C9AB24}">
+                <p16:designElem xmlns:p16="http://schemas.microsoft.com/office/powerpoint/2015/main" val="1"/>
+              </p:ext>
+            </p:extLst>
+          </p:nvPr>
+        </p:nvSpPr>
+        <p:spPr>
+          <a:xfrm>
+            <a:off x="5315061" y="-2"/>
+            <a:ext cx="6876939" cy="6858002"/>
+          </a:xfrm>
+          <a:prstGeom prst="rect">
+            <a:avLst/>
+          </a:prstGeom>
+          <a:solidFill>
+            <a:schemeClr val="tx1">
+              <a:lumMod val="85000"/>
+              <a:lumOff val="15000"/>
+            </a:schemeClr>
+          </a:solidFill>
+          <a:ln>
+            <a:noFill/>
+          </a:ln>
+        </p:spPr>
+        <p:style>
+          <a:lnRef idx="2">
+            <a:schemeClr val="accent1">
+              <a:shade val="50000"/>
+            </a:schemeClr>
+          </a:lnRef>
+          <a:fillRef idx="1">
+            <a:schemeClr val="accent1"/>
+          </a:fillRef>
+          <a:effectRef idx="0">
+            <a:schemeClr val="accent1"/>
+          </a:effectRef>
+          <a:fontRef idx="minor">
+            <a:schemeClr val="lt1"/>
+          </a:fontRef>
+        </p:style>
+        <p:txBody>
+          <a:bodyPr rtlCol="0" anchor="ctr"/>
+          <a:lstStyle/>
+          <a:p>
+            <a:pPr algn="ctr"/>
+            <a:endParaRPr lang="en-US"/>
+          </a:p>
+        </p:txBody>
+      </p:sp>
+      <p:sp>
+        <p:nvSpPr>
+          <p:cNvPr id="2" name="Title 1"/>
+          <p:cNvSpPr>
+            <a:spLocks noGrp="1"/>
+          </p:cNvSpPr>
+          <p:nvPr>
+            <p:ph type="title"/>
+          </p:nvPr>
+        </p:nvSpPr>
+        <p:spPr>
+          <a:xfrm>
+            <a:off x="829781" y="2745736"/>
+            <a:ext cx="3698803" cy="1366528"/>
+          </a:xfrm>
+          <a:solidFill>
+            <a:schemeClr val="bg1">
+              <a:alpha val="50000"/>
+            </a:schemeClr>
+          </a:solidFill>
+          <a:ln w="25400" cap="sq">
+            <a:solidFill>
+              <a:schemeClr val="tx1"/>
+            </a:solidFill>
+            <a:miter lim="800000"/>
+          </a:ln>
+        </p:spPr>
+        <p:txBody>
+          <a:bodyPr>
+            <a:normAutofit/>
+          </a:bodyPr>
+          <a:lstStyle/>
+          <a:p>
+            <a:pPr algn="ctr"/>
+            <a:r>
+              <a:rPr lang="en-US" sz="4000" dirty="0">
+                <a:latin typeface="Elephant" panose="02020904090505020303" pitchFamily="18" charset="0"/>
+              </a:rPr>
+              <a:t>Challenges</a:t>
+            </a:r>
+          </a:p>
+        </p:txBody>
+      </p:sp>
+      <p:sp>
+        <p:nvSpPr>
+          <p:cNvPr id="3" name="Content Placeholder 2"/>
+          <p:cNvSpPr>
+            <a:spLocks noGrp="1"/>
+          </p:cNvSpPr>
+          <p:nvPr>
+            <p:ph idx="1"/>
+          </p:nvPr>
+        </p:nvSpPr>
+        <p:spPr>
+          <a:xfrm>
+            <a:off x="6049182" y="802638"/>
+            <a:ext cx="5408696" cy="5252722"/>
+          </a:xfrm>
+        </p:spPr>
+        <p:txBody>
+          <a:bodyPr anchor="ctr">
+            <a:normAutofit/>
+          </a:bodyPr>
+          <a:lstStyle/>
+          <a:p>
+            <a:r>
+              <a:rPr lang="en-US" sz="3000" dirty="0">
+                <a:solidFill>
+                  <a:schemeClr val="bg1"/>
+                </a:solidFill>
+                <a:latin typeface="Batang" panose="02030600000101010101" pitchFamily="18" charset="-127"/>
+                <a:ea typeface="Batang" panose="02030600000101010101" pitchFamily="18" charset="-127"/>
+              </a:rPr>
+              <a:t>Friends feature</a:t>
+            </a:r>
+          </a:p>
+          <a:p>
+            <a:pPr lvl="1"/>
+            <a:r>
+              <a:rPr lang="en-US" dirty="0">
+                <a:solidFill>
+                  <a:schemeClr val="bg1"/>
+                </a:solidFill>
+                <a:latin typeface="Batang" panose="02030600000101010101" pitchFamily="18" charset="-127"/>
+                <a:ea typeface="Batang" panose="02030600000101010101" pitchFamily="18" charset="-127"/>
+              </a:rPr>
+              <a:t>More complex to develop</a:t>
+            </a:r>
+          </a:p>
+          <a:p>
+            <a:pPr lvl="1"/>
+            <a:r>
+              <a:rPr lang="en-US" dirty="0">
+                <a:solidFill>
+                  <a:schemeClr val="bg1"/>
+                </a:solidFill>
+                <a:latin typeface="Batang" panose="02030600000101010101" pitchFamily="18" charset="-127"/>
+                <a:ea typeface="Batang" panose="02030600000101010101" pitchFamily="18" charset="-127"/>
+              </a:rPr>
+              <a:t>Decided that it wasn’t needed for the purpose of the app</a:t>
+            </a:r>
+          </a:p>
+          <a:p>
+            <a:pPr marL="457200" lvl="1" indent="0">
+              <a:buNone/>
+            </a:pPr>
+            <a:endParaRPr lang="en-US" dirty="0">
+              <a:solidFill>
+                <a:schemeClr val="bg1"/>
+              </a:solidFill>
+              <a:latin typeface="Batang" panose="02030600000101010101" pitchFamily="18" charset="-127"/>
+              <a:ea typeface="Batang" panose="02030600000101010101" pitchFamily="18" charset="-127"/>
+            </a:endParaRPr>
+          </a:p>
+          <a:p>
+            <a:r>
+              <a:rPr lang="en-US" sz="3000" dirty="0">
+                <a:solidFill>
+                  <a:schemeClr val="bg1"/>
+                </a:solidFill>
+                <a:latin typeface="Batang" panose="02030600000101010101" pitchFamily="18" charset="-127"/>
+                <a:ea typeface="Batang" panose="02030600000101010101" pitchFamily="18" charset="-127"/>
+              </a:rPr>
+              <a:t>Off campus events</a:t>
+            </a:r>
+          </a:p>
+          <a:p>
+            <a:pPr lvl="1"/>
+            <a:r>
+              <a:rPr lang="en-US" dirty="0">
+                <a:solidFill>
+                  <a:schemeClr val="bg1"/>
+                </a:solidFill>
+                <a:latin typeface="Batang" panose="02030600000101010101" pitchFamily="18" charset="-127"/>
+                <a:ea typeface="Batang" panose="02030600000101010101" pitchFamily="18" charset="-127"/>
+              </a:rPr>
+              <a:t>More concerned with on campus events</a:t>
+            </a:r>
+          </a:p>
+          <a:p>
+            <a:pPr lvl="1"/>
+            <a:r>
+              <a:rPr lang="en-US" dirty="0">
+                <a:solidFill>
+                  <a:schemeClr val="bg1"/>
+                </a:solidFill>
+                <a:latin typeface="Batang" panose="02030600000101010101" pitchFamily="18" charset="-127"/>
+                <a:ea typeface="Batang" panose="02030600000101010101" pitchFamily="18" charset="-127"/>
+              </a:rPr>
+              <a:t>Didn’t deem it to be necessary for original purpose</a:t>
+            </a:r>
+          </a:p>
+          <a:p>
+            <a:pPr marL="0" indent="0">
+              <a:buNone/>
+            </a:pPr>
+            <a:endParaRPr lang="en-US" sz="2400" dirty="0">
+              <a:solidFill>
+                <a:schemeClr val="bg1"/>
+              </a:solidFill>
+            </a:endParaRPr>
+          </a:p>
+        </p:txBody>
+      </p:sp>
+    </p:spTree>
+    <p:extLst>
+      <p:ext uri="{BB962C8B-B14F-4D97-AF65-F5344CB8AC3E}">
+        <p14:creationId xmlns:p14="http://schemas.microsoft.com/office/powerpoint/2010/main" val="1833779197"/>
+      </p:ext>
+    </p:extLst>
+  </p:cSld>
+  <p:clrMapOvr>
+    <a:masterClrMapping/>
+  </p:clrMapOvr>
+</p:sld>
+</file>
+
+<file path=ppt/slides/slide15.xml><?xml version="1.0" encoding="utf-8"?>
+<p:sld xmlns:a="http://schemas.openxmlformats.org/drawingml/2006/main" xmlns:r="http://schemas.openxmlformats.org/officeDocument/2006/relationships" xmlns:p="http://schemas.openxmlformats.org/presentationml/2006/main">
+  <p:cSld>
+    <p:spTree>
+      <p:nvGrpSpPr>
+        <p:cNvPr id="1" name=""/>
+        <p:cNvGrpSpPr/>
+        <p:nvPr/>
+      </p:nvGrpSpPr>
+      <p:grpSpPr>
+        <a:xfrm>
+          <a:off x="0" y="0"/>
+          <a:ext cx="0" cy="0"/>
+          <a:chOff x="0" y="0"/>
+          <a:chExt cx="0" cy="0"/>
+        </a:xfrm>
+      </p:grpSpPr>
+      <p:sp>
+        <p:nvSpPr>
+          <p:cNvPr id="7" name="Rectangle 6"/>
+          <p:cNvSpPr>
+            <a:spLocks noGrp="1" noRot="1" noChangeAspect="1" noMove="1" noResize="1" noEditPoints="1" noAdjustHandles="1" noChangeArrowheads="1" noChangeShapeType="1" noTextEdit="1"/>
+          </p:cNvSpPr>
+          <p:nvPr>
+            <p:extLst>
+              <p:ext uri="{386F3935-93C4-4BCD-93E2-E3B085C9AB24}">
+                <p16:designElem xmlns:p16="http://schemas.microsoft.com/office/powerpoint/2015/main" val="1"/>
+              </p:ext>
+            </p:extLst>
+          </p:nvPr>
+        </p:nvSpPr>
+        <p:spPr bwMode="white">
+          <a:xfrm>
+            <a:off x="0" y="0"/>
+            <a:ext cx="12192000" cy="6858000"/>
+          </a:xfrm>
+          <a:prstGeom prst="rect">
+            <a:avLst/>
+          </a:prstGeom>
+          <a:solidFill>
+            <a:schemeClr val="bg1"/>
+          </a:solidFill>
+          <a:ln>
+            <a:noFill/>
+          </a:ln>
+          <a:effectLst/>
+        </p:spPr>
+      </p:sp>
+      <p:sp>
+        <p:nvSpPr>
+          <p:cNvPr id="9" name="Rectangle 8"/>
+          <p:cNvSpPr>
+            <a:spLocks noGrp="1" noRot="1" noChangeAspect="1" noMove="1" noResize="1" noEditPoints="1" noAdjustHandles="1" noChangeArrowheads="1" noChangeShapeType="1" noTextEdit="1"/>
+          </p:cNvSpPr>
+          <p:nvPr>
+            <p:extLst>
+              <p:ext uri="{386F3935-93C4-4BCD-93E2-E3B085C9AB24}">
+                <p16:designElem xmlns:p16="http://schemas.microsoft.com/office/powerpoint/2015/main" val="1"/>
+              </p:ext>
+            </p:extLst>
+          </p:nvPr>
+        </p:nvSpPr>
+        <p:spPr bwMode="ltGray">
+          <a:xfrm>
+            <a:off x="321564" y="320040"/>
+            <a:ext cx="11548872" cy="6217920"/>
+          </a:xfrm>
+          <a:prstGeom prst="rect">
+            <a:avLst/>
+          </a:prstGeom>
+          <a:solidFill>
+            <a:schemeClr val="tx1">
+              <a:lumMod val="75000"/>
+              <a:lumOff val="25000"/>
+            </a:schemeClr>
+          </a:solidFill>
+          <a:ln w="127000" cap="sq" cmpd="thinThick">
+            <a:noFill/>
+          </a:ln>
+        </p:spPr>
+        <p:style>
+          <a:lnRef idx="2">
+            <a:schemeClr val="accent1">
+              <a:shade val="50000"/>
+            </a:schemeClr>
+          </a:lnRef>
+          <a:fillRef idx="1">
+            <a:schemeClr val="accent1"/>
+          </a:fillRef>
+          <a:effectRef idx="0">
+            <a:schemeClr val="accent1"/>
+          </a:effectRef>
+          <a:fontRef idx="minor">
+            <a:schemeClr val="lt1"/>
+          </a:fontRef>
+        </p:style>
+        <p:txBody>
+          <a:bodyPr rtlCol="0" anchor="ctr"/>
+          <a:lstStyle/>
+          <a:p>
+            <a:pPr algn="ctr"/>
+            <a:endParaRPr lang="en-US"/>
+          </a:p>
+        </p:txBody>
+      </p:sp>
+      <p:cxnSp>
+        <p:nvCxnSpPr>
+          <p:cNvPr id="11" name="Straight Connector 10"/>
+          <p:cNvCxnSpPr>
+            <a:cxnSpLocks noGrp="1" noRot="1" noChangeAspect="1" noMove="1" noResize="1" noEditPoints="1" noAdjustHandles="1" noChangeArrowheads="1" noChangeShapeType="1"/>
+          </p:cNvCxnSpPr>
+          <p:nvPr>
+            <p:extLst>
+              <p:ext uri="{386F3935-93C4-4BCD-93E2-E3B085C9AB24}">
+                <p16:designElem xmlns:p16="http://schemas.microsoft.com/office/powerpoint/2015/main" val="1"/>
+              </p:ext>
+            </p:extLst>
+          </p:nvPr>
+        </p:nvCxnSpPr>
+        <p:spPr>
+          <a:xfrm>
+            <a:off x="4055891" y="2057399"/>
+            <a:ext cx="0" cy="2743200"/>
+          </a:xfrm>
+          <a:prstGeom prst="line">
+            <a:avLst/>
+          </a:prstGeom>
+          <a:ln w="19050">
+            <a:solidFill>
+              <a:schemeClr val="bg1"/>
+            </a:solidFill>
+          </a:ln>
+        </p:spPr>
+        <p:style>
+          <a:lnRef idx="1">
+            <a:schemeClr val="accent1"/>
+          </a:lnRef>
+          <a:fillRef idx="0">
+            <a:schemeClr val="accent1"/>
+          </a:fillRef>
+          <a:effectRef idx="0">
+            <a:schemeClr val="accent1"/>
+          </a:effectRef>
+          <a:fontRef idx="minor">
+            <a:schemeClr val="tx1"/>
+          </a:fontRef>
+        </p:style>
+      </p:cxnSp>
+      <p:sp>
+        <p:nvSpPr>
+          <p:cNvPr id="2" name="Title 1"/>
+          <p:cNvSpPr>
+            <a:spLocks noGrp="1"/>
+          </p:cNvSpPr>
+          <p:nvPr>
+            <p:ph type="title"/>
+          </p:nvPr>
+        </p:nvSpPr>
+        <p:spPr>
+          <a:xfrm>
+            <a:off x="5104358" y="1125835"/>
+            <a:ext cx="6766078" cy="4927601"/>
+          </a:xfrm>
+        </p:spPr>
+        <p:txBody>
+          <a:bodyPr vert="horz" lIns="91440" tIns="45720" rIns="91440" bIns="45720" rtlCol="0" anchor="ctr">
+            <a:normAutofit/>
+          </a:bodyPr>
+          <a:lstStyle/>
+          <a:p>
+            <a:r>
+              <a:rPr lang="en-US" sz="6000" dirty="0">
+                <a:solidFill>
+                  <a:schemeClr val="bg1"/>
+                </a:solidFill>
+                <a:latin typeface="Elephant" panose="02020904090505020303" pitchFamily="18" charset="0"/>
+              </a:rPr>
+              <a:t>Questions so far?</a:t>
+            </a:r>
+          </a:p>
+        </p:txBody>
+      </p:sp>
+    </p:spTree>
+    <p:extLst>
+      <p:ext uri="{BB962C8B-B14F-4D97-AF65-F5344CB8AC3E}">
+        <p14:creationId xmlns:p14="http://schemas.microsoft.com/office/powerpoint/2010/main" val="2784140818"/>
+      </p:ext>
+    </p:extLst>
+  </p:cSld>
+  <p:clrMapOvr>
+    <a:masterClrMapping/>
+  </p:clrMapOvr>
+</p:sld>
+</file>
+
+<file path=ppt/slides/slide16.xml><?xml version="1.0" encoding="utf-8"?>
+<p:sld xmlns:a="http://schemas.openxmlformats.org/drawingml/2006/main" xmlns:r="http://schemas.openxmlformats.org/officeDocument/2006/relationships" xmlns:p="http://schemas.openxmlformats.org/presentationml/2006/main">
+  <p:cSld>
+    <p:spTree>
+      <p:nvGrpSpPr>
+        <p:cNvPr id="1" name=""/>
+        <p:cNvGrpSpPr/>
+        <p:nvPr/>
+      </p:nvGrpSpPr>
+      <p:grpSpPr>
+        <a:xfrm>
+          <a:off x="0" y="0"/>
+          <a:ext cx="0" cy="0"/>
+          <a:chOff x="0" y="0"/>
+          <a:chExt cx="0" cy="0"/>
+        </a:xfrm>
+      </p:grpSpPr>
+      <p:sp>
+        <p:nvSpPr>
+          <p:cNvPr id="9" name="Rectangle 8"/>
+          <p:cNvSpPr>
+            <a:spLocks noGrp="1" noRot="1" noChangeAspect="1" noMove="1" noResize="1" noEditPoints="1" noAdjustHandles="1" noChangeArrowheads="1" noChangeShapeType="1" noTextEdit="1"/>
+          </p:cNvSpPr>
+          <p:nvPr>
+            <p:extLst>
+              <p:ext uri="{386F3935-93C4-4BCD-93E2-E3B085C9AB24}">
+                <p16:designElem xmlns:p16="http://schemas.microsoft.com/office/powerpoint/2015/main" val="1"/>
+              </p:ext>
+            </p:extLst>
+          </p:nvPr>
+        </p:nvSpPr>
+        <p:spPr bwMode="white">
+          <a:xfrm>
+            <a:off x="0" y="0"/>
+            <a:ext cx="12192000" cy="6858000"/>
+          </a:xfrm>
+          <a:prstGeom prst="rect">
+            <a:avLst/>
+          </a:prstGeom>
+          <a:solidFill>
+            <a:schemeClr val="bg1"/>
+          </a:solidFill>
+          <a:ln>
+            <a:noFill/>
+          </a:ln>
+          <a:effectLst/>
+        </p:spPr>
+      </p:sp>
+      <p:sp>
+        <p:nvSpPr>
+          <p:cNvPr id="11" name="Rectangle 10"/>
+          <p:cNvSpPr>
+            <a:spLocks noGrp="1" noRot="1" noChangeAspect="1" noMove="1" noResize="1" noEditPoints="1" noAdjustHandles="1" noChangeArrowheads="1" noChangeShapeType="1" noTextEdit="1"/>
+          </p:cNvSpPr>
+          <p:nvPr>
+            <p:extLst>
+              <p:ext uri="{386F3935-93C4-4BCD-93E2-E3B085C9AB24}">
+                <p16:designElem xmlns:p16="http://schemas.microsoft.com/office/powerpoint/2015/main" val="1"/>
+              </p:ext>
+            </p:extLst>
+          </p:nvPr>
+        </p:nvSpPr>
+        <p:spPr bwMode="ltGray">
+          <a:xfrm>
+            <a:off x="321564" y="320040"/>
+            <a:ext cx="11548872" cy="6217920"/>
+          </a:xfrm>
+          <a:prstGeom prst="rect">
+            <a:avLst/>
+          </a:prstGeom>
+          <a:solidFill>
+            <a:schemeClr val="tx1">
+              <a:lumMod val="75000"/>
+              <a:lumOff val="25000"/>
+            </a:schemeClr>
+          </a:solidFill>
+          <a:ln w="127000" cap="sq" cmpd="thinThick">
+            <a:noFill/>
+          </a:ln>
+        </p:spPr>
+        <p:style>
+          <a:lnRef idx="2">
+            <a:schemeClr val="accent1">
+              <a:shade val="50000"/>
+            </a:schemeClr>
+          </a:lnRef>
+          <a:fillRef idx="1">
+            <a:schemeClr val="accent1"/>
+          </a:fillRef>
+          <a:effectRef idx="0">
+            <a:schemeClr val="accent1"/>
+          </a:effectRef>
+          <a:fontRef idx="minor">
+            <a:schemeClr val="lt1"/>
+          </a:fontRef>
+        </p:style>
+        <p:txBody>
+          <a:bodyPr rtlCol="0" anchor="ctr"/>
+          <a:lstStyle/>
+          <a:p>
+            <a:pPr algn="ctr"/>
+            <a:endParaRPr lang="en-US"/>
+          </a:p>
+        </p:txBody>
+      </p:sp>
+      <p:cxnSp>
+        <p:nvCxnSpPr>
+          <p:cNvPr id="13" name="Straight Connector 12"/>
+          <p:cNvCxnSpPr>
+            <a:cxnSpLocks noGrp="1" noRot="1" noChangeAspect="1" noMove="1" noResize="1" noEditPoints="1" noAdjustHandles="1" noChangeArrowheads="1" noChangeShapeType="1"/>
+          </p:cNvCxnSpPr>
+          <p:nvPr>
+            <p:extLst>
+              <p:ext uri="{386F3935-93C4-4BCD-93E2-E3B085C9AB24}">
+                <p16:designElem xmlns:p16="http://schemas.microsoft.com/office/powerpoint/2015/main" val="1"/>
+              </p:ext>
+            </p:extLst>
+          </p:nvPr>
+        </p:nvCxnSpPr>
+        <p:spPr>
+          <a:xfrm>
+            <a:off x="4055891" y="2057399"/>
+            <a:ext cx="0" cy="2743200"/>
+          </a:xfrm>
+          <a:prstGeom prst="line">
+            <a:avLst/>
+          </a:prstGeom>
+          <a:ln w="19050">
+            <a:solidFill>
+              <a:schemeClr val="bg1"/>
+            </a:solidFill>
+          </a:ln>
+        </p:spPr>
+        <p:style>
+          <a:lnRef idx="1">
+            <a:schemeClr val="accent1"/>
+          </a:lnRef>
+          <a:fillRef idx="0">
+            <a:schemeClr val="accent1"/>
+          </a:fillRef>
+          <a:effectRef idx="0">
+            <a:schemeClr val="accent1"/>
+          </a:effectRef>
+          <a:fontRef idx="minor">
+            <a:schemeClr val="tx1"/>
+          </a:fontRef>
+        </p:style>
+      </p:cxnSp>
+      <p:sp>
+        <p:nvSpPr>
+          <p:cNvPr id="2" name="Title 1"/>
+          <p:cNvSpPr>
+            <a:spLocks noGrp="1"/>
+          </p:cNvSpPr>
+          <p:nvPr>
+            <p:ph type="title"/>
+          </p:nvPr>
+        </p:nvSpPr>
+        <p:spPr>
+          <a:xfrm>
+            <a:off x="4380588" y="965199"/>
+            <a:ext cx="6766078" cy="4927601"/>
+          </a:xfrm>
+        </p:spPr>
+        <p:txBody>
+          <a:bodyPr vert="horz" lIns="91440" tIns="45720" rIns="91440" bIns="45720" rtlCol="0" anchor="ctr">
+            <a:normAutofit/>
+          </a:bodyPr>
+          <a:lstStyle/>
+          <a:p>
+            <a:r>
+              <a:rPr lang="en-US" sz="4800" dirty="0">
+                <a:solidFill>
+                  <a:schemeClr val="bg1"/>
+                </a:solidFill>
+              </a:rPr>
+              <a:t>		</a:t>
+            </a:r>
+            <a:r>
+              <a:rPr lang="en-US" sz="6000" dirty="0">
+                <a:solidFill>
+                  <a:schemeClr val="bg1"/>
+                </a:solidFill>
+              </a:rPr>
+              <a:t>	</a:t>
+            </a:r>
+            <a:r>
+              <a:rPr lang="en-US" sz="6000" dirty="0">
+                <a:solidFill>
+                  <a:schemeClr val="bg1"/>
+                </a:solidFill>
+                <a:latin typeface="Elephant" panose="02020904090505020303" pitchFamily="18" charset="0"/>
+              </a:rPr>
+              <a:t>Demo</a:t>
+            </a:r>
+          </a:p>
+        </p:txBody>
+      </p:sp>
+    </p:spTree>
+    <p:extLst>
+      <p:ext uri="{BB962C8B-B14F-4D97-AF65-F5344CB8AC3E}">
+        <p14:creationId xmlns:p14="http://schemas.microsoft.com/office/powerpoint/2010/main" val="2675655798"/>
+      </p:ext>
+    </p:extLst>
+  </p:cSld>
+  <p:clrMapOvr>
+    <a:masterClrMapping/>
+  </p:clrMapOvr>
+</p:sld>
+</file>
+
+<file path=ppt/slides/slide2.xml><?xml version="1.0" encoding="utf-8"?>
+<p:sld xmlns:a="http://schemas.openxmlformats.org/drawingml/2006/main" xmlns:r="http://schemas.openxmlformats.org/officeDocument/2006/relationships" xmlns:p="http://schemas.openxmlformats.org/presentationml/2006/main">
+  <p:cSld>
+    <p:bg>
+      <p:bgPr>
+        <a:solidFill>
+          <a:schemeClr val="tx1"/>
+        </a:solidFill>
+        <a:effectLst/>
+      </p:bgPr>
+    </p:bg>
+    <p:spTree>
+      <p:nvGrpSpPr>
+        <p:cNvPr id="1" name=""/>
+        <p:cNvGrpSpPr/>
+        <p:nvPr/>
+      </p:nvGrpSpPr>
+      <p:grpSpPr>
+        <a:xfrm>
+          <a:off x="0" y="0"/>
+          <a:ext cx="0" cy="0"/>
+          <a:chOff x="0" y="0"/>
+          <a:chExt cx="0" cy="0"/>
+        </a:xfrm>
+      </p:grpSpPr>
+      <p:sp>
+        <p:nvSpPr>
+          <p:cNvPr id="17" name="Rectangle 16"/>
+          <p:cNvSpPr>
+            <a:spLocks noGrp="1" noRot="1" noChangeAspect="1" noMove="1" noResize="1" noEditPoints="1" noAdjustHandles="1" noChangeArrowheads="1" noChangeShapeType="1" noTextEdit="1"/>
+          </p:cNvSpPr>
+          <p:nvPr>
+            <p:extLst>
+              <p:ext uri="{386F3935-93C4-4BCD-93E2-E3B085C9AB24}">
+                <p16:designElem xmlns:p16="http://schemas.microsoft.com/office/powerpoint/2015/main" val="1"/>
+              </p:ext>
+            </p:extLst>
+          </p:nvPr>
+        </p:nvSpPr>
+        <p:spPr bwMode="white">
+          <a:xfrm>
+            <a:off x="0" y="0"/>
+            <a:ext cx="12192000" cy="6858000"/>
+          </a:xfrm>
+          <a:prstGeom prst="rect">
+            <a:avLst/>
+          </a:prstGeom>
+          <a:solidFill>
+            <a:schemeClr val="tx1"/>
+          </a:solidFill>
+          <a:effectLst/>
+        </p:spPr>
+      </p:sp>
+      <p:sp>
+        <p:nvSpPr>
+          <p:cNvPr id="19" name="Rectangle 18"/>
+          <p:cNvSpPr>
+            <a:spLocks noGrp="1" noRot="1" noChangeAspect="1" noMove="1" noResize="1" noEditPoints="1" noAdjustHandles="1" noChangeArrowheads="1" noChangeShapeType="1" noTextEdit="1"/>
+          </p:cNvSpPr>
+          <p:nvPr>
+            <p:extLst>
+              <p:ext uri="{386F3935-93C4-4BCD-93E2-E3B085C9AB24}">
+                <p16:designElem xmlns:p16="http://schemas.microsoft.com/office/powerpoint/2015/main" val="1"/>
+              </p:ext>
+            </p:extLst>
+          </p:nvPr>
+        </p:nvSpPr>
+        <p:spPr>
+          <a:xfrm>
+            <a:off x="0" y="-3324"/>
+            <a:ext cx="12192000" cy="6861324"/>
+          </a:xfrm>
+          <a:prstGeom prst="rect">
+            <a:avLst/>
+          </a:prstGeom>
+          <a:solidFill>
+            <a:schemeClr val="tx1"/>
+          </a:solidFill>
+          <a:ln>
+            <a:noFill/>
+          </a:ln>
+        </p:spPr>
+        <p:style>
+          <a:lnRef idx="2">
+            <a:schemeClr val="accent1">
+              <a:shade val="50000"/>
+            </a:schemeClr>
+          </a:lnRef>
+          <a:fillRef idx="1">
+            <a:schemeClr val="accent1"/>
+          </a:fillRef>
+          <a:effectRef idx="0">
+            <a:schemeClr val="accent1"/>
+          </a:effectRef>
+          <a:fontRef idx="minor">
+            <a:schemeClr val="lt1"/>
+          </a:fontRef>
+        </p:style>
+        <p:txBody>
+          <a:bodyPr rtlCol="0" anchor="ctr"/>
+          <a:lstStyle/>
+          <a:p>
+            <a:pPr algn="ctr"/>
+            <a:endParaRPr lang="en-US"/>
+          </a:p>
+        </p:txBody>
+      </p:sp>
+      <p:sp>
+        <p:nvSpPr>
+          <p:cNvPr id="21" name="Rectangle 20"/>
+          <p:cNvSpPr>
+            <a:spLocks noGrp="1" noRot="1" noChangeAspect="1" noMove="1" noResize="1" noEditPoints="1" noAdjustHandles="1" noChangeArrowheads="1" noChangeShapeType="1" noTextEdit="1"/>
+          </p:cNvSpPr>
+          <p:nvPr>
+            <p:extLst>
+              <p:ext uri="{386F3935-93C4-4BCD-93E2-E3B085C9AB24}">
+                <p16:designElem xmlns:p16="http://schemas.microsoft.com/office/powerpoint/2015/main" val="1"/>
+              </p:ext>
+            </p:extLst>
+          </p:nvPr>
+        </p:nvSpPr>
+        <p:spPr bwMode="ltGray">
+          <a:xfrm>
+            <a:off x="321734" y="321733"/>
+            <a:ext cx="11573488" cy="6214534"/>
+          </a:xfrm>
+          <a:prstGeom prst="rect">
+            <a:avLst/>
+          </a:prstGeom>
+          <a:solidFill>
+            <a:schemeClr val="bg1">
+              <a:lumMod val="75000"/>
+              <a:lumOff val="25000"/>
+            </a:schemeClr>
+          </a:solidFill>
+          <a:ln w="127000" cap="sq" cmpd="thinThick">
+            <a:solidFill>
+              <a:schemeClr val="bg1">
+                <a:lumMod val="75000"/>
+                <a:lumOff val="25000"/>
+              </a:schemeClr>
+            </a:solidFill>
+          </a:ln>
+        </p:spPr>
+        <p:style>
+          <a:lnRef idx="2">
+            <a:schemeClr val="accent1">
+              <a:shade val="50000"/>
+            </a:schemeClr>
+          </a:lnRef>
+          <a:fillRef idx="1">
+            <a:schemeClr val="accent1"/>
+          </a:fillRef>
+          <a:effectRef idx="0">
+            <a:schemeClr val="accent1"/>
+          </a:effectRef>
+          <a:fontRef idx="minor">
+            <a:schemeClr val="lt1"/>
+          </a:fontRef>
+        </p:style>
+        <p:txBody>
+          <a:bodyPr rtlCol="0" anchor="ctr"/>
+          <a:lstStyle/>
+          <a:p>
+            <a:pPr algn="ctr"/>
+            <a:endParaRPr lang="en-US"/>
+          </a:p>
+        </p:txBody>
+      </p:sp>
+      <p:cxnSp>
+        <p:nvCxnSpPr>
+          <p:cNvPr id="23" name="Straight Connector 22"/>
+          <p:cNvCxnSpPr>
+            <a:cxnSpLocks noGrp="1" noRot="1" noChangeAspect="1" noMove="1" noResize="1" noEditPoints="1" noAdjustHandles="1" noChangeArrowheads="1" noChangeShapeType="1"/>
+          </p:cNvCxnSpPr>
+          <p:nvPr>
+            <p:extLst>
+              <p:ext uri="{386F3935-93C4-4BCD-93E2-E3B085C9AB24}">
+                <p16:designElem xmlns:p16="http://schemas.microsoft.com/office/powerpoint/2015/main" val="1"/>
+              </p:ext>
+            </p:extLst>
+          </p:nvPr>
+        </p:nvCxnSpPr>
+        <p:spPr>
+          <a:xfrm>
+            <a:off x="4724400" y="4109417"/>
+            <a:ext cx="2743200" cy="0"/>
+          </a:xfrm>
+          <a:prstGeom prst="line">
+            <a:avLst/>
+          </a:prstGeom>
+          <a:ln w="12700">
+            <a:solidFill>
+              <a:schemeClr val="tx1">
+                <a:lumMod val="85000"/>
+              </a:schemeClr>
+            </a:solidFill>
+          </a:ln>
+        </p:spPr>
+        <p:style>
+          <a:lnRef idx="1">
+            <a:schemeClr val="accent1"/>
+          </a:lnRef>
+          <a:fillRef idx="0">
+            <a:schemeClr val="accent1"/>
+          </a:fillRef>
+          <a:effectRef idx="0">
+            <a:schemeClr val="accent1"/>
+          </a:effectRef>
+          <a:fontRef idx="minor">
+            <a:schemeClr val="tx1"/>
+          </a:fontRef>
+        </p:style>
+      </p:cxnSp>
+      <p:sp>
+        <p:nvSpPr>
+          <p:cNvPr id="2" name="Title 1"/>
+          <p:cNvSpPr>
+            <a:spLocks noGrp="1"/>
+          </p:cNvSpPr>
+          <p:nvPr>
+            <p:ph type="title"/>
+          </p:nvPr>
+        </p:nvSpPr>
+        <p:spPr>
+          <a:xfrm>
+            <a:off x="1687854" y="2284628"/>
+            <a:ext cx="9144000" cy="2840037"/>
+          </a:xfrm>
+        </p:spPr>
+        <p:txBody>
+          <a:bodyPr vert="horz" lIns="91440" tIns="45720" rIns="91440" bIns="45720" rtlCol="0" anchor="b">
+            <a:normAutofit/>
+          </a:bodyPr>
+          <a:lstStyle/>
+          <a:p>
+            <a:pPr algn="ctr"/>
+            <a:r>
+              <a:rPr lang="en-US" sz="6000" dirty="0">
+                <a:latin typeface="Elephant" panose="02020904090505020303" pitchFamily="18" charset="0"/>
+              </a:rPr>
               <a:t>Vision Statement</a:t>
             </a:r>
-          </a:p>
-        </p:txBody>
-      </p:sp>
-      <p:sp>
-        <p:nvSpPr>
-          <p:cNvPr id="3" name="Content Placeholder 2"/>
-          <p:cNvSpPr>
-            <a:spLocks noGrp="1"/>
-          </p:cNvSpPr>
-          <p:nvPr>
-            <p:ph idx="1"/>
-          </p:nvPr>
-        </p:nvSpPr>
-        <p:spPr>
-          <a:xfrm>
-            <a:off x="838199" y="1825625"/>
-            <a:ext cx="11079997" cy="4351338"/>
-          </a:xfrm>
-        </p:spPr>
-        <p:txBody>
-          <a:bodyPr/>
-          <a:lstStyle/>
-          <a:p>
-            <a:r>
-              <a:rPr lang="en-US" dirty="0"/>
+            <a:br>
+              <a:rPr lang="en-US" sz="5800" dirty="0"/>
+            </a:br>
+            <a:br>
+              <a:rPr lang="en-US" sz="5800" dirty="0"/>
+            </a:br>
+            <a:endParaRPr lang="en-US" sz="5800" dirty="0"/>
+          </a:p>
+        </p:txBody>
+      </p:sp>
+      <p:sp>
+        <p:nvSpPr>
+          <p:cNvPr id="5" name="TextBox 4"/>
+          <p:cNvSpPr txBox="1"/>
+          <p:nvPr/>
+        </p:nvSpPr>
+        <p:spPr>
+          <a:xfrm>
+            <a:off x="263610" y="4339627"/>
+            <a:ext cx="11664779" cy="1292662"/>
+          </a:xfrm>
+          <a:prstGeom prst="rect">
+            <a:avLst/>
+          </a:prstGeom>
+          <a:noFill/>
+        </p:spPr>
+        <p:txBody>
+          <a:bodyPr wrap="square" rtlCol="0">
+            <a:spAutoFit/>
+          </a:bodyPr>
+          <a:lstStyle/>
+          <a:p>
+            <a:pPr algn="ctr"/>
+            <a:r>
+              <a:rPr lang="en-US" sz="3000" dirty="0">
+                <a:latin typeface="Batang" panose="02030600000101010101" pitchFamily="18" charset="-127"/>
+                <a:ea typeface="Batang" panose="02030600000101010101" pitchFamily="18" charset="-127"/>
+              </a:rPr>
               <a:t>Making it easier for CU students to find and participate in events on campus</a:t>
             </a:r>
+          </a:p>
+          <a:p>
             <a:endParaRPr lang="en-US" dirty="0"/>
           </a:p>
         </p:txBody>
@@ -3172,7 +5285,7 @@
     </p:extLst>
   </p:cSld>
   <p:clrMapOvr>
-    <a:masterClrMapping/>
+    <a:overrideClrMapping bg1="dk1" tx1="lt1" bg2="dk2" tx2="lt2" accent1="accent1" accent2="accent2" accent3="accent3" accent4="accent4" accent5="accent5" accent6="accent6" hlink="hlink" folHlink="folHlink"/>
   </p:clrMapOvr>
 </p:sld>
 </file>
@@ -3196,6 +5309,137 @@
       </p:grpSpPr>
       <p:sp>
         <p:nvSpPr>
+          <p:cNvPr id="7" name="Rectangle 6"/>
+          <p:cNvSpPr>
+            <a:spLocks noGrp="1" noRot="1" noChangeAspect="1" noMove="1" noResize="1" noEditPoints="1" noAdjustHandles="1" noChangeArrowheads="1" noChangeShapeType="1" noTextEdit="1"/>
+          </p:cNvSpPr>
+          <p:nvPr>
+            <p:extLst>
+              <p:ext uri="{386F3935-93C4-4BCD-93E2-E3B085C9AB24}">
+                <p16:designElem xmlns:p16="http://schemas.microsoft.com/office/powerpoint/2015/main" val="1"/>
+              </p:ext>
+            </p:extLst>
+          </p:nvPr>
+        </p:nvSpPr>
+        <p:spPr bwMode="white">
+          <a:xfrm>
+            <a:off x="0" y="0"/>
+            <a:ext cx="12192000" cy="6858000"/>
+          </a:xfrm>
+          <a:prstGeom prst="rect">
+            <a:avLst/>
+          </a:prstGeom>
+          <a:solidFill>
+            <a:schemeClr val="bg1"/>
+          </a:solidFill>
+          <a:ln>
+            <a:noFill/>
+          </a:ln>
+          <a:effectLst/>
+        </p:spPr>
+      </p:sp>
+      <p:sp>
+        <p:nvSpPr>
+          <p:cNvPr id="9" name="Rectangle 8"/>
+          <p:cNvSpPr>
+            <a:spLocks noGrp="1" noRot="1" noChangeAspect="1" noMove="1" noResize="1" noEditPoints="1" noAdjustHandles="1" noChangeArrowheads="1" noChangeShapeType="1" noTextEdit="1"/>
+          </p:cNvSpPr>
+          <p:nvPr>
+            <p:extLst>
+              <p:ext uri="{386F3935-93C4-4BCD-93E2-E3B085C9AB24}">
+                <p16:designElem xmlns:p16="http://schemas.microsoft.com/office/powerpoint/2015/main" val="1"/>
+              </p:ext>
+            </p:extLst>
+          </p:nvPr>
+        </p:nvSpPr>
+        <p:spPr bwMode="ltGray">
+          <a:xfrm>
+            <a:off x="321564" y="320040"/>
+            <a:ext cx="11548872" cy="6217920"/>
+          </a:xfrm>
+          <a:prstGeom prst="rect">
+            <a:avLst/>
+          </a:prstGeom>
+          <a:solidFill>
+            <a:schemeClr val="tx1">
+              <a:lumMod val="75000"/>
+              <a:lumOff val="25000"/>
+            </a:schemeClr>
+          </a:solidFill>
+          <a:ln w="127000" cap="sq" cmpd="thinThick">
+            <a:noFill/>
+          </a:ln>
+        </p:spPr>
+        <p:style>
+          <a:lnRef idx="2">
+            <a:schemeClr val="accent1">
+              <a:shade val="50000"/>
+            </a:schemeClr>
+          </a:lnRef>
+          <a:fillRef idx="1">
+            <a:schemeClr val="accent1"/>
+          </a:fillRef>
+          <a:effectRef idx="0">
+            <a:schemeClr val="accent1"/>
+          </a:effectRef>
+          <a:fontRef idx="minor">
+            <a:schemeClr val="lt1"/>
+          </a:fontRef>
+        </p:style>
+        <p:txBody>
+          <a:bodyPr rtlCol="0" anchor="ctr"/>
+          <a:lstStyle/>
+          <a:p>
+            <a:pPr algn="ctr"/>
+            <a:endParaRPr lang="en-US"/>
+          </a:p>
+        </p:txBody>
+      </p:sp>
+      <p:cxnSp>
+        <p:nvCxnSpPr>
+          <p:cNvPr id="11" name="Straight Connector 10"/>
+          <p:cNvCxnSpPr>
+            <a:cxnSpLocks noGrp="1" noRot="1" noChangeAspect="1" noMove="1" noResize="1" noEditPoints="1" noAdjustHandles="1" noChangeArrowheads="1" noChangeShapeType="1"/>
+          </p:cNvCxnSpPr>
+          <p:nvPr>
+            <p:extLst>
+              <p:ext uri="{386F3935-93C4-4BCD-93E2-E3B085C9AB24}">
+                <p16:designElem xmlns:p16="http://schemas.microsoft.com/office/powerpoint/2015/main" val="1"/>
+              </p:ext>
+            </p:extLst>
+          </p:nvPr>
+        </p:nvCxnSpPr>
+        <p:spPr>
+          <a:xfrm>
+            <a:off x="4055891" y="2057399"/>
+            <a:ext cx="0" cy="2743200"/>
+          </a:xfrm>
+          <a:prstGeom prst="line">
+            <a:avLst/>
+          </a:prstGeom>
+          <a:ln w="19050">
+            <a:solidFill>
+              <a:schemeClr val="bg1"/>
+            </a:solidFill>
+          </a:ln>
+        </p:spPr>
+        <p:style>
+          <a:lnRef idx="1">
+            <a:schemeClr val="accent1"/>
+          </a:lnRef>
+          <a:fillRef idx="0">
+            <a:schemeClr val="accent1"/>
+          </a:fillRef>
+          <a:effectRef idx="0">
+            <a:schemeClr val="accent1"/>
+          </a:effectRef>
+          <a:fontRef idx="minor">
+            <a:schemeClr val="tx1"/>
+          </a:fontRef>
+        </p:style>
+      </p:cxnSp>
+      <p:sp>
+        <p:nvSpPr>
           <p:cNvPr id="2" name="Title 1"/>
           <p:cNvSpPr>
             <a:spLocks noGrp="1"/>
@@ -3204,93 +5448,34 @@
             <p:ph type="title"/>
           </p:nvPr>
         </p:nvSpPr>
-        <p:spPr/>
-        <p:txBody>
-          <a:bodyPr/>
-          <a:lstStyle/>
-          <a:p>
-            <a:r>
-              <a:rPr lang="en-US" dirty="0">
+        <p:spPr>
+          <a:xfrm>
+            <a:off x="5950155" y="965198"/>
+            <a:ext cx="6766078" cy="4927601"/>
+          </a:xfrm>
+        </p:spPr>
+        <p:txBody>
+          <a:bodyPr vert="horz" lIns="91440" tIns="45720" rIns="91440" bIns="45720" rtlCol="0" anchor="ctr">
+            <a:normAutofit/>
+          </a:bodyPr>
+          <a:lstStyle/>
+          <a:p>
+            <a:r>
+              <a:rPr lang="en-US" sz="6000" dirty="0">
                 <a:solidFill>
-                  <a:schemeClr val="accent6"/>
+                  <a:schemeClr val="bg1"/>
                 </a:solidFill>
                 <a:latin typeface="Elephant" panose="02020904090505020303" pitchFamily="18" charset="0"/>
               </a:rPr>
-              <a:t>Tools</a:t>
-            </a:r>
-          </a:p>
-        </p:txBody>
-      </p:sp>
-      <p:sp>
-        <p:nvSpPr>
-          <p:cNvPr id="3" name="Content Placeholder 2"/>
-          <p:cNvSpPr>
-            <a:spLocks noGrp="1"/>
-          </p:cNvSpPr>
-          <p:nvPr>
-            <p:ph idx="1"/>
-          </p:nvPr>
-        </p:nvSpPr>
-        <p:spPr/>
-        <p:txBody>
-          <a:bodyPr/>
-          <a:lstStyle/>
-          <a:p>
-            <a:r>
-              <a:rPr lang="en-US" dirty="0"/>
-              <a:t>Project tracking: Trello</a:t>
-            </a:r>
-          </a:p>
-          <a:p>
-            <a:r>
-              <a:rPr lang="en-US" dirty="0"/>
-              <a:t>VCS Repo: </a:t>
-            </a:r>
-            <a:r>
-              <a:rPr lang="en-US" dirty="0" err="1"/>
-              <a:t>Github</a:t>
-            </a:r>
-            <a:endParaRPr lang="en-US" dirty="0"/>
-          </a:p>
-          <a:p>
-            <a:r>
-              <a:rPr lang="en-US" dirty="0"/>
-              <a:t>Database: MySQL</a:t>
-            </a:r>
-          </a:p>
-          <a:p>
-            <a:r>
-              <a:rPr lang="en-US" dirty="0"/>
-              <a:t>Testing: Junit and Espresso</a:t>
-            </a:r>
-          </a:p>
-          <a:p>
-            <a:r>
-              <a:rPr lang="en-US" dirty="0"/>
-              <a:t>Auto-documenter: *</a:t>
-            </a:r>
-          </a:p>
-          <a:p>
-            <a:r>
-              <a:rPr lang="en-US" dirty="0"/>
-              <a:t>Deployment Environment:*</a:t>
-            </a:r>
-          </a:p>
-          <a:p>
-            <a:r>
-              <a:rPr lang="en-US" dirty="0"/>
-              <a:t>Frameworks: Android Studio</a:t>
-            </a:r>
-          </a:p>
-          <a:p>
-            <a:endParaRPr lang="en-US" dirty="0"/>
+              <a:t>Methodologies</a:t>
+            </a:r>
           </a:p>
         </p:txBody>
       </p:sp>
     </p:spTree>
     <p:extLst>
       <p:ext uri="{BB962C8B-B14F-4D97-AF65-F5344CB8AC3E}">
-        <p14:creationId xmlns:p14="http://schemas.microsoft.com/office/powerpoint/2010/main" val="2475618711"/>
+        <p14:creationId xmlns:p14="http://schemas.microsoft.com/office/powerpoint/2010/main" val="2266367147"/>
       </p:ext>
     </p:extLst>
   </p:cSld>
@@ -3319,6 +5504,63 @@
       </p:grpSpPr>
       <p:sp>
         <p:nvSpPr>
+          <p:cNvPr id="8" name="Rectangle 7"/>
+          <p:cNvSpPr>
+            <a:spLocks noGrp="1" noRot="1" noChangeAspect="1" noMove="1" noResize="1" noEditPoints="1" noAdjustHandles="1" noChangeArrowheads="1" noChangeShapeType="1" noTextEdit="1"/>
+          </p:cNvSpPr>
+          <p:nvPr>
+            <p:extLst>
+              <p:ext uri="{386F3935-93C4-4BCD-93E2-E3B085C9AB24}">
+                <p16:designElem xmlns:p16="http://schemas.microsoft.com/office/powerpoint/2015/main" val="1"/>
+              </p:ext>
+            </p:extLst>
+          </p:nvPr>
+        </p:nvSpPr>
+        <p:spPr>
+          <a:xfrm>
+            <a:off x="5315061" y="-2"/>
+            <a:ext cx="6876939" cy="6858002"/>
+          </a:xfrm>
+          <a:prstGeom prst="rect">
+            <a:avLst/>
+          </a:prstGeom>
+          <a:solidFill>
+            <a:schemeClr val="tx1">
+              <a:lumMod val="85000"/>
+              <a:lumOff val="15000"/>
+            </a:schemeClr>
+          </a:solidFill>
+          <a:ln>
+            <a:noFill/>
+          </a:ln>
+        </p:spPr>
+        <p:style>
+          <a:lnRef idx="2">
+            <a:schemeClr val="accent1">
+              <a:shade val="50000"/>
+            </a:schemeClr>
+          </a:lnRef>
+          <a:fillRef idx="1">
+            <a:schemeClr val="accent1"/>
+          </a:fillRef>
+          <a:effectRef idx="0">
+            <a:schemeClr val="accent1"/>
+          </a:effectRef>
+          <a:fontRef idx="minor">
+            <a:schemeClr val="lt1"/>
+          </a:fontRef>
+        </p:style>
+        <p:txBody>
+          <a:bodyPr rtlCol="0" anchor="ctr"/>
+          <a:lstStyle/>
+          <a:p>
+            <a:pPr algn="ctr"/>
+            <a:endParaRPr lang="en-US"/>
+          </a:p>
+        </p:txBody>
+      </p:sp>
+      <p:sp>
+        <p:nvSpPr>
           <p:cNvPr id="2" name="Title 1"/>
           <p:cNvSpPr>
             <a:spLocks noGrp="1"/>
@@ -3327,19 +5569,35 @@
             <p:ph type="title"/>
           </p:nvPr>
         </p:nvSpPr>
-        <p:spPr/>
-        <p:txBody>
-          <a:bodyPr/>
-          <a:lstStyle/>
-          <a:p>
-            <a:r>
-              <a:rPr lang="en-US" dirty="0">
-                <a:solidFill>
-                  <a:schemeClr val="accent6"/>
-                </a:solidFill>
+        <p:spPr>
+          <a:xfrm>
+            <a:off x="829781" y="2335427"/>
+            <a:ext cx="3698803" cy="1776837"/>
+          </a:xfrm>
+          <a:solidFill>
+            <a:schemeClr val="bg1">
+              <a:alpha val="50000"/>
+            </a:schemeClr>
+          </a:solidFill>
+          <a:ln w="25400" cap="sq">
+            <a:solidFill>
+              <a:schemeClr val="tx1"/>
+            </a:solidFill>
+            <a:miter lim="800000"/>
+          </a:ln>
+        </p:spPr>
+        <p:txBody>
+          <a:bodyPr>
+            <a:noAutofit/>
+          </a:bodyPr>
+          <a:lstStyle/>
+          <a:p>
+            <a:pPr algn="ctr"/>
+            <a:r>
+              <a:rPr lang="en-US" sz="4000" dirty="0">
                 <a:latin typeface="Elephant" panose="02020904090505020303" pitchFamily="18" charset="0"/>
               </a:rPr>
-              <a:t>Methodologies</a:t>
+              <a:t>Agile and Peer Code Review</a:t>
             </a:r>
           </a:p>
         </p:txBody>
@@ -3354,26 +5612,75 @@
             <p:ph idx="1"/>
           </p:nvPr>
         </p:nvSpPr>
-        <p:spPr/>
-        <p:txBody>
-          <a:bodyPr/>
-          <a:lstStyle/>
-          <a:p>
-            <a:r>
-              <a:rPr lang="en-US" dirty="0"/>
-              <a:t>Agile</a:t>
-            </a:r>
-          </a:p>
-          <a:p>
-            <a:r>
-              <a:rPr lang="en-US" dirty="0"/>
-              <a:t>Peer review code</a:t>
-            </a:r>
-          </a:p>
-          <a:p>
-            <a:r>
-              <a:rPr lang="en-US" dirty="0"/>
-              <a:t>Pair programming</a:t>
+        <p:spPr>
+          <a:xfrm>
+            <a:off x="6049182" y="802638"/>
+            <a:ext cx="5408696" cy="5252722"/>
+          </a:xfrm>
+        </p:spPr>
+        <p:txBody>
+          <a:bodyPr anchor="ctr">
+            <a:noAutofit/>
+          </a:bodyPr>
+          <a:lstStyle/>
+          <a:p>
+            <a:r>
+              <a:rPr lang="en-US" sz="3000" dirty="0">
+                <a:solidFill>
+                  <a:schemeClr val="bg1"/>
+                </a:solidFill>
+                <a:latin typeface="Batang" panose="02030600000101010101" pitchFamily="18" charset="-127"/>
+                <a:ea typeface="Batang" panose="02030600000101010101" pitchFamily="18" charset="-127"/>
+              </a:rPr>
+              <a:t>Tried to work sequentially/iteratively, but would respond to a particular issue if it was a dependency</a:t>
+            </a:r>
+          </a:p>
+          <a:p>
+            <a:pPr marL="0" indent="0">
+              <a:buNone/>
+            </a:pPr>
+            <a:endParaRPr lang="en-US" sz="3000" dirty="0">
+              <a:solidFill>
+                <a:schemeClr val="bg1"/>
+              </a:solidFill>
+              <a:latin typeface="Batang" panose="02030600000101010101" pitchFamily="18" charset="-127"/>
+              <a:ea typeface="Batang" panose="02030600000101010101" pitchFamily="18" charset="-127"/>
+            </a:endParaRPr>
+          </a:p>
+          <a:p>
+            <a:r>
+              <a:rPr lang="en-US" sz="3000" dirty="0">
+                <a:solidFill>
+                  <a:schemeClr val="bg1"/>
+                </a:solidFill>
+                <a:latin typeface="Batang" panose="02030600000101010101" pitchFamily="18" charset="-127"/>
+                <a:ea typeface="Batang" panose="02030600000101010101" pitchFamily="18" charset="-127"/>
+              </a:rPr>
+              <a:t>If issue was not a dependency or didn’t have high priority, would skip it and come back</a:t>
+            </a:r>
+          </a:p>
+          <a:p>
+            <a:pPr marL="0" indent="0">
+              <a:buNone/>
+            </a:pPr>
+            <a:endParaRPr lang="en-US" sz="3000" dirty="0">
+              <a:solidFill>
+                <a:schemeClr val="bg1"/>
+              </a:solidFill>
+              <a:latin typeface="Batang" panose="02030600000101010101" pitchFamily="18" charset="-127"/>
+              <a:ea typeface="Batang" panose="02030600000101010101" pitchFamily="18" charset="-127"/>
+            </a:endParaRPr>
+          </a:p>
+          <a:p>
+            <a:r>
+              <a:rPr lang="en-US" sz="3000" dirty="0">
+                <a:solidFill>
+                  <a:schemeClr val="bg1"/>
+                </a:solidFill>
+                <a:latin typeface="Batang" panose="02030600000101010101" pitchFamily="18" charset="-127"/>
+                <a:ea typeface="Batang" panose="02030600000101010101" pitchFamily="18" charset="-127"/>
+              </a:rPr>
+              <a:t>Helped each other fix bugs</a:t>
             </a:r>
           </a:p>
         </p:txBody>
@@ -3381,7 +5688,7 @@
     </p:spTree>
     <p:extLst>
       <p:ext uri="{BB962C8B-B14F-4D97-AF65-F5344CB8AC3E}">
-        <p14:creationId xmlns:p14="http://schemas.microsoft.com/office/powerpoint/2010/main" val="2266367147"/>
+        <p14:creationId xmlns:p14="http://schemas.microsoft.com/office/powerpoint/2010/main" val="2740583488"/>
       </p:ext>
     </p:extLst>
   </p:cSld>
@@ -3410,6 +5717,137 @@
       </p:grpSpPr>
       <p:sp>
         <p:nvSpPr>
+          <p:cNvPr id="7" name="Rectangle 6"/>
+          <p:cNvSpPr>
+            <a:spLocks noGrp="1" noRot="1" noChangeAspect="1" noMove="1" noResize="1" noEditPoints="1" noAdjustHandles="1" noChangeArrowheads="1" noChangeShapeType="1" noTextEdit="1"/>
+          </p:cNvSpPr>
+          <p:nvPr>
+            <p:extLst>
+              <p:ext uri="{386F3935-93C4-4BCD-93E2-E3B085C9AB24}">
+                <p16:designElem xmlns:p16="http://schemas.microsoft.com/office/powerpoint/2015/main" val="1"/>
+              </p:ext>
+            </p:extLst>
+          </p:nvPr>
+        </p:nvSpPr>
+        <p:spPr bwMode="white">
+          <a:xfrm>
+            <a:off x="0" y="0"/>
+            <a:ext cx="12192000" cy="6858000"/>
+          </a:xfrm>
+          <a:prstGeom prst="rect">
+            <a:avLst/>
+          </a:prstGeom>
+          <a:solidFill>
+            <a:schemeClr val="bg1"/>
+          </a:solidFill>
+          <a:ln>
+            <a:noFill/>
+          </a:ln>
+          <a:effectLst/>
+        </p:spPr>
+      </p:sp>
+      <p:sp>
+        <p:nvSpPr>
+          <p:cNvPr id="9" name="Rectangle 8"/>
+          <p:cNvSpPr>
+            <a:spLocks noGrp="1" noRot="1" noChangeAspect="1" noMove="1" noResize="1" noEditPoints="1" noAdjustHandles="1" noChangeArrowheads="1" noChangeShapeType="1" noTextEdit="1"/>
+          </p:cNvSpPr>
+          <p:nvPr>
+            <p:extLst>
+              <p:ext uri="{386F3935-93C4-4BCD-93E2-E3B085C9AB24}">
+                <p16:designElem xmlns:p16="http://schemas.microsoft.com/office/powerpoint/2015/main" val="1"/>
+              </p:ext>
+            </p:extLst>
+          </p:nvPr>
+        </p:nvSpPr>
+        <p:spPr bwMode="ltGray">
+          <a:xfrm>
+            <a:off x="321564" y="320040"/>
+            <a:ext cx="11548872" cy="6217920"/>
+          </a:xfrm>
+          <a:prstGeom prst="rect">
+            <a:avLst/>
+          </a:prstGeom>
+          <a:solidFill>
+            <a:schemeClr val="tx1">
+              <a:lumMod val="75000"/>
+              <a:lumOff val="25000"/>
+            </a:schemeClr>
+          </a:solidFill>
+          <a:ln w="127000" cap="sq" cmpd="thinThick">
+            <a:noFill/>
+          </a:ln>
+        </p:spPr>
+        <p:style>
+          <a:lnRef idx="2">
+            <a:schemeClr val="accent1">
+              <a:shade val="50000"/>
+            </a:schemeClr>
+          </a:lnRef>
+          <a:fillRef idx="1">
+            <a:schemeClr val="accent1"/>
+          </a:fillRef>
+          <a:effectRef idx="0">
+            <a:schemeClr val="accent1"/>
+          </a:effectRef>
+          <a:fontRef idx="minor">
+            <a:schemeClr val="lt1"/>
+          </a:fontRef>
+        </p:style>
+        <p:txBody>
+          <a:bodyPr rtlCol="0" anchor="ctr"/>
+          <a:lstStyle/>
+          <a:p>
+            <a:pPr algn="ctr"/>
+            <a:endParaRPr lang="en-US"/>
+          </a:p>
+        </p:txBody>
+      </p:sp>
+      <p:cxnSp>
+        <p:nvCxnSpPr>
+          <p:cNvPr id="11" name="Straight Connector 10"/>
+          <p:cNvCxnSpPr>
+            <a:cxnSpLocks noGrp="1" noRot="1" noChangeAspect="1" noMove="1" noResize="1" noEditPoints="1" noAdjustHandles="1" noChangeArrowheads="1" noChangeShapeType="1"/>
+          </p:cNvCxnSpPr>
+          <p:nvPr>
+            <p:extLst>
+              <p:ext uri="{386F3935-93C4-4BCD-93E2-E3B085C9AB24}">
+                <p16:designElem xmlns:p16="http://schemas.microsoft.com/office/powerpoint/2015/main" val="1"/>
+              </p:ext>
+            </p:extLst>
+          </p:nvPr>
+        </p:nvCxnSpPr>
+        <p:spPr>
+          <a:xfrm>
+            <a:off x="4055891" y="2057399"/>
+            <a:ext cx="0" cy="2743200"/>
+          </a:xfrm>
+          <a:prstGeom prst="line">
+            <a:avLst/>
+          </a:prstGeom>
+          <a:ln w="19050">
+            <a:solidFill>
+              <a:schemeClr val="bg1"/>
+            </a:solidFill>
+          </a:ln>
+        </p:spPr>
+        <p:style>
+          <a:lnRef idx="1">
+            <a:schemeClr val="accent1"/>
+          </a:lnRef>
+          <a:fillRef idx="0">
+            <a:schemeClr val="accent1"/>
+          </a:fillRef>
+          <a:effectRef idx="0">
+            <a:schemeClr val="accent1"/>
+          </a:effectRef>
+          <a:fontRef idx="minor">
+            <a:schemeClr val="tx1"/>
+          </a:fontRef>
+        </p:style>
+      </p:cxnSp>
+      <p:sp>
+        <p:nvSpPr>
           <p:cNvPr id="2" name="Title 1"/>
           <p:cNvSpPr>
             <a:spLocks noGrp="1"/>
@@ -3418,75 +5856,42 @@
             <p:ph type="title"/>
           </p:nvPr>
         </p:nvSpPr>
-        <p:spPr/>
-        <p:txBody>
-          <a:bodyPr/>
-          <a:lstStyle/>
-          <a:p>
-            <a:r>
-              <a:rPr lang="en-US" dirty="0">
+        <p:spPr>
+          <a:xfrm>
+            <a:off x="4380588" y="965199"/>
+            <a:ext cx="6766078" cy="4927601"/>
+          </a:xfrm>
+        </p:spPr>
+        <p:txBody>
+          <a:bodyPr vert="horz" lIns="91440" tIns="45720" rIns="91440" bIns="45720" rtlCol="0" anchor="ctr">
+            <a:normAutofit/>
+          </a:bodyPr>
+          <a:lstStyle/>
+          <a:p>
+            <a:r>
+              <a:rPr lang="en-US" sz="4800" dirty="0">
                 <a:solidFill>
-                  <a:schemeClr val="accent6"/>
+                  <a:schemeClr val="bg1"/>
+                </a:solidFill>
+              </a:rPr>
+              <a:t>				</a:t>
+            </a:r>
+            <a:r>
+              <a:rPr lang="en-US" sz="6000" dirty="0">
+                <a:solidFill>
+                  <a:schemeClr val="bg1"/>
                 </a:solidFill>
                 <a:latin typeface="Elephant" panose="02020904090505020303" pitchFamily="18" charset="0"/>
               </a:rPr>
-              <a:t>Challenges</a:t>
-            </a:r>
-          </a:p>
-        </p:txBody>
-      </p:sp>
-      <p:sp>
-        <p:nvSpPr>
-          <p:cNvPr id="3" name="Content Placeholder 2"/>
-          <p:cNvSpPr>
-            <a:spLocks noGrp="1"/>
-          </p:cNvSpPr>
-          <p:nvPr>
-            <p:ph idx="1"/>
-          </p:nvPr>
-        </p:nvSpPr>
-        <p:spPr/>
-        <p:txBody>
-          <a:bodyPr/>
-          <a:lstStyle/>
-          <a:p>
-            <a:r>
-              <a:rPr lang="en-US" dirty="0"/>
-              <a:t>Friends feature</a:t>
-            </a:r>
-          </a:p>
-          <a:p>
-            <a:pPr lvl="1"/>
-            <a:r>
-              <a:rPr lang="en-US" dirty="0"/>
-              <a:t>explanation</a:t>
-            </a:r>
-          </a:p>
-          <a:p>
-            <a:r>
-              <a:rPr lang="en-US" dirty="0"/>
-              <a:t>Off campus events</a:t>
-            </a:r>
-          </a:p>
-          <a:p>
-            <a:pPr lvl="1"/>
-            <a:r>
-              <a:rPr lang="en-US" dirty="0"/>
-              <a:t>explanation</a:t>
-            </a:r>
-          </a:p>
-          <a:p>
-            <a:pPr marL="0" indent="0">
-              <a:buNone/>
-            </a:pPr>
-            <a:endParaRPr lang="en-US" dirty="0"/>
+              <a:t>Tools</a:t>
+            </a:r>
           </a:p>
         </p:txBody>
       </p:sp>
     </p:spTree>
     <p:extLst>
       <p:ext uri="{BB962C8B-B14F-4D97-AF65-F5344CB8AC3E}">
-        <p14:creationId xmlns:p14="http://schemas.microsoft.com/office/powerpoint/2010/main" val="1833779197"/>
+        <p14:creationId xmlns:p14="http://schemas.microsoft.com/office/powerpoint/2010/main" val="2475618711"/>
       </p:ext>
     </p:extLst>
   </p:cSld>
@@ -3515,6 +5920,130 @@
       </p:grpSpPr>
       <p:sp>
         <p:nvSpPr>
+          <p:cNvPr id="10" name="Rectangle 9"/>
+          <p:cNvSpPr>
+            <a:spLocks noGrp="1" noRot="1" noChangeAspect="1" noMove="1" noResize="1" noEditPoints="1" noAdjustHandles="1" noChangeArrowheads="1" noChangeShapeType="1" noTextEdit="1"/>
+          </p:cNvSpPr>
+          <p:nvPr>
+            <p:extLst>
+              <p:ext uri="{386F3935-93C4-4BCD-93E2-E3B085C9AB24}">
+                <p16:designElem xmlns:p16="http://schemas.microsoft.com/office/powerpoint/2015/main" val="1"/>
+              </p:ext>
+            </p:extLst>
+          </p:nvPr>
+        </p:nvSpPr>
+        <p:spPr bwMode="white">
+          <a:xfrm>
+            <a:off x="0" y="0"/>
+            <a:ext cx="12192000" cy="6858000"/>
+          </a:xfrm>
+          <a:prstGeom prst="rect">
+            <a:avLst/>
+          </a:prstGeom>
+          <a:solidFill>
+            <a:schemeClr val="bg1"/>
+          </a:solidFill>
+          <a:ln>
+            <a:noFill/>
+          </a:ln>
+          <a:effectLst/>
+        </p:spPr>
+      </p:sp>
+      <p:sp>
+        <p:nvSpPr>
+          <p:cNvPr id="12" name="Rectangle 11"/>
+          <p:cNvSpPr>
+            <a:spLocks noGrp="1" noRot="1" noChangeAspect="1" noMove="1" noResize="1" noEditPoints="1" noAdjustHandles="1" noChangeArrowheads="1" noChangeShapeType="1" noTextEdit="1"/>
+          </p:cNvSpPr>
+          <p:nvPr>
+            <p:extLst>
+              <p:ext uri="{386F3935-93C4-4BCD-93E2-E3B085C9AB24}">
+                <p16:designElem xmlns:p16="http://schemas.microsoft.com/office/powerpoint/2015/main" val="1"/>
+              </p:ext>
+            </p:extLst>
+          </p:nvPr>
+        </p:nvSpPr>
+        <p:spPr>
+          <a:xfrm>
+            <a:off x="0" y="2"/>
+            <a:ext cx="4636008" cy="6857998"/>
+          </a:xfrm>
+          <a:prstGeom prst="rect">
+            <a:avLst/>
+          </a:prstGeom>
+          <a:solidFill>
+            <a:schemeClr val="tx1">
+              <a:lumMod val="85000"/>
+              <a:lumOff val="15000"/>
+            </a:schemeClr>
+          </a:solidFill>
+          <a:ln>
+            <a:noFill/>
+          </a:ln>
+          <a:effectLst/>
+        </p:spPr>
+        <p:style>
+          <a:lnRef idx="1">
+            <a:schemeClr val="accent1"/>
+          </a:lnRef>
+          <a:fillRef idx="3">
+            <a:schemeClr val="accent1"/>
+          </a:fillRef>
+          <a:effectRef idx="2">
+            <a:schemeClr val="accent1"/>
+          </a:effectRef>
+          <a:fontRef idx="minor">
+            <a:schemeClr val="lt1"/>
+          </a:fontRef>
+        </p:style>
+        <p:txBody>
+          <a:bodyPr rtlCol="0" anchor="ctr"/>
+          <a:lstStyle/>
+          <a:p>
+            <a:pPr algn="ctr" defTabSz="457200"/>
+            <a:endParaRPr lang="en-US">
+              <a:solidFill>
+                <a:srgbClr val="FFFFFF"/>
+              </a:solidFill>
+              <a:latin typeface="Calibri" panose="020F0502020204030204"/>
+            </a:endParaRPr>
+          </a:p>
+        </p:txBody>
+      </p:sp>
+      <p:pic>
+        <p:nvPicPr>
+          <p:cNvPr id="5" name="Picture Placeholder 4"/>
+          <p:cNvPicPr>
+            <a:picLocks noGrp="1" noChangeAspect="1"/>
+          </p:cNvPicPr>
+          <p:nvPr>
+            <p:ph type="pic" idx="1"/>
+          </p:nvPr>
+        </p:nvPicPr>
+        <p:blipFill rotWithShape="1">
+          <a:blip r:embed="rId2">
+            <a:extLst>
+              <a:ext uri="{28A0092B-C50C-407E-A947-70E740481C1C}">
+                <a14:useLocalDpi xmlns:a14="http://schemas.microsoft.com/office/drawing/2010/main" val="0"/>
+              </a:ext>
+            </a:extLst>
+          </a:blip>
+          <a:srcRect l="2957" r="12761" b="1"/>
+          <a:stretch/>
+        </p:blipFill>
+        <p:spPr>
+          <a:xfrm>
+            <a:off x="625755" y="1728788"/>
+            <a:ext cx="3384497" cy="2446868"/>
+          </a:xfrm>
+          <a:prstGeom prst="rect">
+            <a:avLst/>
+          </a:prstGeom>
+          <a:effectLst/>
+        </p:spPr>
+      </p:pic>
+      <p:sp>
+        <p:nvSpPr>
           <p:cNvPr id="2" name="Title 1"/>
           <p:cNvSpPr>
             <a:spLocks noGrp="1"/>
@@ -3523,49 +6052,1010 @@
             <p:ph type="title"/>
           </p:nvPr>
         </p:nvSpPr>
-        <p:spPr/>
-        <p:txBody>
-          <a:bodyPr/>
-          <a:lstStyle/>
-          <a:p>
-            <a:r>
-              <a:rPr lang="en-US" dirty="0">
+        <p:spPr>
+          <a:xfrm>
+            <a:off x="484486" y="52185"/>
+            <a:ext cx="3667039" cy="1676603"/>
+          </a:xfrm>
+        </p:spPr>
+        <p:txBody>
+          <a:bodyPr vert="horz" lIns="91440" tIns="45720" rIns="91440" bIns="45720" rtlCol="0" anchor="ctr">
+            <a:normAutofit/>
+          </a:bodyPr>
+          <a:lstStyle/>
+          <a:p>
+            <a:pPr algn="ctr"/>
+            <a:r>
+              <a:rPr lang="en-US" sz="3600" dirty="0">
                 <a:solidFill>
-                  <a:schemeClr val="accent6"/>
+                  <a:schemeClr val="bg1"/>
                 </a:solidFill>
                 <a:latin typeface="Elephant" panose="02020904090505020303" pitchFamily="18" charset="0"/>
               </a:rPr>
-              <a:t>Demo</a:t>
-            </a:r>
-          </a:p>
-        </p:txBody>
-      </p:sp>
-      <p:sp>
-        <p:nvSpPr>
-          <p:cNvPr id="3" name="Content Placeholder 2"/>
-          <p:cNvSpPr>
-            <a:spLocks noGrp="1"/>
-          </p:cNvSpPr>
-          <p:nvPr>
-            <p:ph idx="1"/>
-          </p:nvPr>
-        </p:nvSpPr>
-        <p:spPr/>
-        <p:txBody>
-          <a:bodyPr/>
-          <a:lstStyle/>
-          <a:p>
-            <a:r>
-              <a:rPr lang="en-US" dirty="0"/>
-              <a:t>Maybe a video of a demo we can play?</a:t>
-            </a:r>
-          </a:p>
-        </p:txBody>
-      </p:sp>
+              <a:t>Project Tracker</a:t>
+            </a:r>
+          </a:p>
+        </p:txBody>
+      </p:sp>
+      <p:sp>
+        <p:nvSpPr>
+          <p:cNvPr id="4" name="Text Placeholder 3"/>
+          <p:cNvSpPr>
+            <a:spLocks noGrp="1"/>
+          </p:cNvSpPr>
+          <p:nvPr>
+            <p:ph type="body" sz="half" idx="2"/>
+          </p:nvPr>
+        </p:nvSpPr>
+        <p:spPr>
+          <a:xfrm>
+            <a:off x="484486" y="4316628"/>
+            <a:ext cx="3667036" cy="3779520"/>
+          </a:xfrm>
+        </p:spPr>
+        <p:txBody>
+          <a:bodyPr vert="horz" lIns="91440" tIns="45720" rIns="91440" bIns="45720" rtlCol="0">
+            <a:normAutofit/>
+          </a:bodyPr>
+          <a:lstStyle/>
+          <a:p>
+            <a:pPr marL="57150" algn="ctr"/>
+            <a:r>
+              <a:rPr lang="en-US" sz="2400" dirty="0">
+                <a:solidFill>
+                  <a:schemeClr val="bg1"/>
+                </a:solidFill>
+                <a:latin typeface="Batang" panose="02030600000101010101" pitchFamily="18" charset="-127"/>
+                <a:ea typeface="Batang" panose="02030600000101010101" pitchFamily="18" charset="-127"/>
+              </a:rPr>
+              <a:t>Purpose: </a:t>
+            </a:r>
+          </a:p>
+          <a:p>
+            <a:pPr marL="57150" algn="ctr"/>
+            <a:r>
+              <a:rPr lang="en-US" sz="2400" dirty="0">
+                <a:solidFill>
+                  <a:schemeClr val="bg1"/>
+                </a:solidFill>
+                <a:latin typeface="Batang" panose="02030600000101010101" pitchFamily="18" charset="-127"/>
+                <a:ea typeface="Batang" panose="02030600000101010101" pitchFamily="18" charset="-127"/>
+              </a:rPr>
+              <a:t>Kept track of parts of the project that needed to be finished </a:t>
+            </a:r>
+          </a:p>
+          <a:p>
+            <a:pPr marL="57150" algn="ctr"/>
+            <a:r>
+              <a:rPr lang="en-US" sz="6000" dirty="0">
+                <a:solidFill>
+                  <a:srgbClr val="FF0000"/>
+                </a:solidFill>
+                <a:latin typeface="Batang" panose="02030600000101010101" pitchFamily="18" charset="-127"/>
+                <a:ea typeface="Batang" panose="02030600000101010101" pitchFamily="18" charset="-127"/>
+              </a:rPr>
+              <a:t>3.5</a:t>
+            </a:r>
+          </a:p>
+        </p:txBody>
+      </p:sp>
+      <p:pic>
+        <p:nvPicPr>
+          <p:cNvPr id="6" name="Picture 5"/>
+          <p:cNvPicPr>
+            <a:picLocks noChangeAspect="1"/>
+          </p:cNvPicPr>
+          <p:nvPr/>
+        </p:nvPicPr>
+        <p:blipFill>
+          <a:blip r:embed="rId3">
+            <a:extLst>
+              <a:ext uri="{28A0092B-C50C-407E-A947-70E740481C1C}">
+                <a14:useLocalDpi xmlns:a14="http://schemas.microsoft.com/office/drawing/2010/main" val="0"/>
+              </a:ext>
+            </a:extLst>
+          </a:blip>
+          <a:stretch>
+            <a:fillRect/>
+          </a:stretch>
+        </p:blipFill>
+        <p:spPr>
+          <a:xfrm>
+            <a:off x="4878251" y="744248"/>
+            <a:ext cx="7071506" cy="4803936"/>
+          </a:xfrm>
+          <a:prstGeom prst="rect">
+            <a:avLst/>
+          </a:prstGeom>
+        </p:spPr>
+      </p:pic>
     </p:spTree>
     <p:extLst>
       <p:ext uri="{BB962C8B-B14F-4D97-AF65-F5344CB8AC3E}">
-        <p14:creationId xmlns:p14="http://schemas.microsoft.com/office/powerpoint/2010/main" val="2675655798"/>
+        <p14:creationId xmlns:p14="http://schemas.microsoft.com/office/powerpoint/2010/main" val="2568668805"/>
+      </p:ext>
+    </p:extLst>
+  </p:cSld>
+  <p:clrMapOvr>
+    <a:masterClrMapping/>
+  </p:clrMapOvr>
+</p:sld>
+</file>
+
+<file path=ppt/slides/slide7.xml><?xml version="1.0" encoding="utf-8"?>
+<p:sld xmlns:a="http://schemas.openxmlformats.org/drawingml/2006/main" xmlns:r="http://schemas.openxmlformats.org/officeDocument/2006/relationships" xmlns:p="http://schemas.openxmlformats.org/presentationml/2006/main">
+  <p:cSld>
+    <p:spTree>
+      <p:nvGrpSpPr>
+        <p:cNvPr id="1" name=""/>
+        <p:cNvGrpSpPr/>
+        <p:nvPr/>
+      </p:nvGrpSpPr>
+      <p:grpSpPr>
+        <a:xfrm>
+          <a:off x="0" y="0"/>
+          <a:ext cx="0" cy="0"/>
+          <a:chOff x="0" y="0"/>
+          <a:chExt cx="0" cy="0"/>
+        </a:xfrm>
+      </p:grpSpPr>
+      <p:sp>
+        <p:nvSpPr>
+          <p:cNvPr id="10" name="Rectangle 9"/>
+          <p:cNvSpPr>
+            <a:spLocks noGrp="1" noRot="1" noChangeAspect="1" noMove="1" noResize="1" noEditPoints="1" noAdjustHandles="1" noChangeArrowheads="1" noChangeShapeType="1" noTextEdit="1"/>
+          </p:cNvSpPr>
+          <p:nvPr>
+            <p:extLst>
+              <p:ext uri="{386F3935-93C4-4BCD-93E2-E3B085C9AB24}">
+                <p16:designElem xmlns:p16="http://schemas.microsoft.com/office/powerpoint/2015/main" val="1"/>
+              </p:ext>
+            </p:extLst>
+          </p:nvPr>
+        </p:nvSpPr>
+        <p:spPr bwMode="white">
+          <a:xfrm>
+            <a:off x="0" y="0"/>
+            <a:ext cx="12192000" cy="6858000"/>
+          </a:xfrm>
+          <a:prstGeom prst="rect">
+            <a:avLst/>
+          </a:prstGeom>
+          <a:solidFill>
+            <a:schemeClr val="bg1"/>
+          </a:solidFill>
+          <a:ln>
+            <a:noFill/>
+          </a:ln>
+          <a:effectLst/>
+        </p:spPr>
+      </p:sp>
+      <p:sp>
+        <p:nvSpPr>
+          <p:cNvPr id="12" name="Rectangle 11"/>
+          <p:cNvSpPr>
+            <a:spLocks noGrp="1" noRot="1" noChangeAspect="1" noMove="1" noResize="1" noEditPoints="1" noAdjustHandles="1" noChangeArrowheads="1" noChangeShapeType="1" noTextEdit="1"/>
+          </p:cNvSpPr>
+          <p:nvPr>
+            <p:extLst>
+              <p:ext uri="{386F3935-93C4-4BCD-93E2-E3B085C9AB24}">
+                <p16:designElem xmlns:p16="http://schemas.microsoft.com/office/powerpoint/2015/main" val="1"/>
+              </p:ext>
+            </p:extLst>
+          </p:nvPr>
+        </p:nvSpPr>
+        <p:spPr>
+          <a:xfrm>
+            <a:off x="0" y="2"/>
+            <a:ext cx="4636008" cy="6857998"/>
+          </a:xfrm>
+          <a:prstGeom prst="rect">
+            <a:avLst/>
+          </a:prstGeom>
+          <a:solidFill>
+            <a:schemeClr val="tx1">
+              <a:lumMod val="85000"/>
+              <a:lumOff val="15000"/>
+            </a:schemeClr>
+          </a:solidFill>
+          <a:ln>
+            <a:noFill/>
+          </a:ln>
+          <a:effectLst/>
+        </p:spPr>
+        <p:style>
+          <a:lnRef idx="1">
+            <a:schemeClr val="accent1"/>
+          </a:lnRef>
+          <a:fillRef idx="3">
+            <a:schemeClr val="accent1"/>
+          </a:fillRef>
+          <a:effectRef idx="2">
+            <a:schemeClr val="accent1"/>
+          </a:effectRef>
+          <a:fontRef idx="minor">
+            <a:schemeClr val="lt1"/>
+          </a:fontRef>
+        </p:style>
+        <p:txBody>
+          <a:bodyPr rtlCol="0" anchor="ctr"/>
+          <a:lstStyle/>
+          <a:p>
+            <a:pPr algn="ctr" defTabSz="457200"/>
+            <a:endParaRPr lang="en-US">
+              <a:solidFill>
+                <a:srgbClr val="FFFFFF"/>
+              </a:solidFill>
+              <a:latin typeface="Calibri" panose="020F0502020204030204"/>
+            </a:endParaRPr>
+          </a:p>
+        </p:txBody>
+      </p:sp>
+      <p:pic>
+        <p:nvPicPr>
+          <p:cNvPr id="5" name="Picture Placeholder 4"/>
+          <p:cNvPicPr>
+            <a:picLocks noGrp="1" noChangeAspect="1"/>
+          </p:cNvPicPr>
+          <p:nvPr>
+            <p:ph type="pic" idx="1"/>
+          </p:nvPr>
+        </p:nvPicPr>
+        <p:blipFill rotWithShape="1">
+          <a:blip r:embed="rId2">
+            <a:extLst>
+              <a:ext uri="{28A0092B-C50C-407E-A947-70E740481C1C}">
+                <a14:useLocalDpi xmlns:a14="http://schemas.microsoft.com/office/drawing/2010/main" val="0"/>
+              </a:ext>
+            </a:extLst>
+          </a:blip>
+          <a:srcRect l="20170" r="20756" b="-1"/>
+          <a:stretch/>
+        </p:blipFill>
+        <p:spPr>
+          <a:xfrm>
+            <a:off x="805769" y="1880825"/>
+            <a:ext cx="3024470" cy="2687911"/>
+          </a:xfrm>
+          <a:prstGeom prst="rect">
+            <a:avLst/>
+          </a:prstGeom>
+          <a:effectLst/>
+        </p:spPr>
+      </p:pic>
+      <p:sp>
+        <p:nvSpPr>
+          <p:cNvPr id="2" name="Title 1"/>
+          <p:cNvSpPr>
+            <a:spLocks noGrp="1"/>
+          </p:cNvSpPr>
+          <p:nvPr>
+            <p:ph type="title"/>
+          </p:nvPr>
+        </p:nvSpPr>
+        <p:spPr>
+          <a:xfrm>
+            <a:off x="484484" y="-5843"/>
+            <a:ext cx="3667039" cy="1676603"/>
+          </a:xfrm>
+        </p:spPr>
+        <p:txBody>
+          <a:bodyPr vert="horz" lIns="91440" tIns="45720" rIns="91440" bIns="45720" rtlCol="0" anchor="ctr">
+            <a:normAutofit/>
+          </a:bodyPr>
+          <a:lstStyle/>
+          <a:p>
+            <a:pPr algn="ctr"/>
+            <a:r>
+              <a:rPr lang="en-US" sz="3600" dirty="0">
+                <a:solidFill>
+                  <a:schemeClr val="bg1"/>
+                </a:solidFill>
+                <a:latin typeface="Elephant" panose="02020904090505020303" pitchFamily="18" charset="0"/>
+              </a:rPr>
+              <a:t>VCS Repository</a:t>
+            </a:r>
+          </a:p>
+        </p:txBody>
+      </p:sp>
+      <p:pic>
+        <p:nvPicPr>
+          <p:cNvPr id="7" name="Picture 6"/>
+          <p:cNvPicPr>
+            <a:picLocks noChangeAspect="1"/>
+          </p:cNvPicPr>
+          <p:nvPr/>
+        </p:nvPicPr>
+        <p:blipFill>
+          <a:blip r:embed="rId3">
+            <a:extLst>
+              <a:ext uri="{28A0092B-C50C-407E-A947-70E740481C1C}">
+                <a14:useLocalDpi xmlns:a14="http://schemas.microsoft.com/office/drawing/2010/main" val="0"/>
+              </a:ext>
+            </a:extLst>
+          </a:blip>
+          <a:stretch>
+            <a:fillRect/>
+          </a:stretch>
+        </p:blipFill>
+        <p:spPr>
+          <a:xfrm>
+            <a:off x="4636008" y="204222"/>
+            <a:ext cx="7555992" cy="6189870"/>
+          </a:xfrm>
+          <a:prstGeom prst="rect">
+            <a:avLst/>
+          </a:prstGeom>
+        </p:spPr>
+      </p:pic>
+      <p:sp>
+        <p:nvSpPr>
+          <p:cNvPr id="8" name="TextBox 7"/>
+          <p:cNvSpPr txBox="1"/>
+          <p:nvPr/>
+        </p:nvSpPr>
+        <p:spPr>
+          <a:xfrm>
+            <a:off x="46105" y="4743872"/>
+            <a:ext cx="4737195" cy="2123658"/>
+          </a:xfrm>
+          <a:prstGeom prst="rect">
+            <a:avLst/>
+          </a:prstGeom>
+          <a:noFill/>
+        </p:spPr>
+        <p:txBody>
+          <a:bodyPr wrap="none" rtlCol="0">
+            <a:spAutoFit/>
+          </a:bodyPr>
+          <a:lstStyle/>
+          <a:p>
+            <a:pPr algn="ctr"/>
+            <a:r>
+              <a:rPr lang="en-US" sz="2400" b="1" dirty="0">
+                <a:solidFill>
+                  <a:schemeClr val="bg1"/>
+                </a:solidFill>
+                <a:latin typeface="Batang" panose="02030600000101010101" pitchFamily="18" charset="-127"/>
+                <a:ea typeface="Batang" panose="02030600000101010101" pitchFamily="18" charset="-127"/>
+              </a:rPr>
+              <a:t>Purpose: </a:t>
+            </a:r>
+          </a:p>
+          <a:p>
+            <a:pPr algn="ctr"/>
+            <a:r>
+              <a:rPr lang="en-US" sz="2400" dirty="0">
+                <a:solidFill>
+                  <a:schemeClr val="bg1"/>
+                </a:solidFill>
+                <a:latin typeface="Batang" panose="02030600000101010101" pitchFamily="18" charset="-127"/>
+                <a:ea typeface="Batang" panose="02030600000101010101" pitchFamily="18" charset="-127"/>
+              </a:rPr>
+              <a:t>Save project-related work for </a:t>
+            </a:r>
+          </a:p>
+          <a:p>
+            <a:pPr algn="ctr"/>
+            <a:r>
+              <a:rPr lang="en-US" sz="2400" dirty="0">
+                <a:solidFill>
+                  <a:schemeClr val="bg1"/>
+                </a:solidFill>
+                <a:latin typeface="Batang" panose="02030600000101010101" pitchFamily="18" charset="-127"/>
+                <a:ea typeface="Batang" panose="02030600000101010101" pitchFamily="18" charset="-127"/>
+              </a:rPr>
+              <a:t>group to easily access</a:t>
+            </a:r>
+          </a:p>
+          <a:p>
+            <a:pPr algn="ctr"/>
+            <a:r>
+              <a:rPr lang="en-US" sz="6000" dirty="0">
+                <a:solidFill>
+                  <a:srgbClr val="FF0000"/>
+                </a:solidFill>
+                <a:latin typeface="Batang" panose="02030600000101010101" pitchFamily="18" charset="-127"/>
+                <a:ea typeface="Batang" panose="02030600000101010101" pitchFamily="18" charset="-127"/>
+              </a:rPr>
+              <a:t>4</a:t>
+            </a:r>
+          </a:p>
+        </p:txBody>
+      </p:sp>
+    </p:spTree>
+    <p:extLst>
+      <p:ext uri="{BB962C8B-B14F-4D97-AF65-F5344CB8AC3E}">
+        <p14:creationId xmlns:p14="http://schemas.microsoft.com/office/powerpoint/2010/main" val="4136811214"/>
+      </p:ext>
+    </p:extLst>
+  </p:cSld>
+  <p:clrMapOvr>
+    <a:masterClrMapping/>
+  </p:clrMapOvr>
+</p:sld>
+</file>
+
+<file path=ppt/slides/slide8.xml><?xml version="1.0" encoding="utf-8"?>
+<p:sld xmlns:a="http://schemas.openxmlformats.org/drawingml/2006/main" xmlns:r="http://schemas.openxmlformats.org/officeDocument/2006/relationships" xmlns:p="http://schemas.openxmlformats.org/presentationml/2006/main">
+  <p:cSld>
+    <p:spTree>
+      <p:nvGrpSpPr>
+        <p:cNvPr id="1" name=""/>
+        <p:cNvGrpSpPr/>
+        <p:nvPr/>
+      </p:nvGrpSpPr>
+      <p:grpSpPr>
+        <a:xfrm>
+          <a:off x="0" y="0"/>
+          <a:ext cx="0" cy="0"/>
+          <a:chOff x="0" y="0"/>
+          <a:chExt cx="0" cy="0"/>
+        </a:xfrm>
+      </p:grpSpPr>
+      <p:sp>
+        <p:nvSpPr>
+          <p:cNvPr id="10" name="Rectangle 9"/>
+          <p:cNvSpPr>
+            <a:spLocks noGrp="1" noRot="1" noChangeAspect="1" noMove="1" noResize="1" noEditPoints="1" noAdjustHandles="1" noChangeArrowheads="1" noChangeShapeType="1" noTextEdit="1"/>
+          </p:cNvSpPr>
+          <p:nvPr>
+            <p:extLst>
+              <p:ext uri="{386F3935-93C4-4BCD-93E2-E3B085C9AB24}">
+                <p16:designElem xmlns:p16="http://schemas.microsoft.com/office/powerpoint/2015/main" val="1"/>
+              </p:ext>
+            </p:extLst>
+          </p:nvPr>
+        </p:nvSpPr>
+        <p:spPr bwMode="white">
+          <a:xfrm>
+            <a:off x="0" y="0"/>
+            <a:ext cx="12192000" cy="6858000"/>
+          </a:xfrm>
+          <a:prstGeom prst="rect">
+            <a:avLst/>
+          </a:prstGeom>
+          <a:solidFill>
+            <a:schemeClr val="bg1"/>
+          </a:solidFill>
+          <a:ln>
+            <a:noFill/>
+          </a:ln>
+          <a:effectLst/>
+        </p:spPr>
+      </p:sp>
+      <p:sp>
+        <p:nvSpPr>
+          <p:cNvPr id="12" name="Rectangle 11"/>
+          <p:cNvSpPr>
+            <a:spLocks noGrp="1" noRot="1" noChangeAspect="1" noMove="1" noResize="1" noEditPoints="1" noAdjustHandles="1" noChangeArrowheads="1" noChangeShapeType="1" noTextEdit="1"/>
+          </p:cNvSpPr>
+          <p:nvPr>
+            <p:extLst>
+              <p:ext uri="{386F3935-93C4-4BCD-93E2-E3B085C9AB24}">
+                <p16:designElem xmlns:p16="http://schemas.microsoft.com/office/powerpoint/2015/main" val="1"/>
+              </p:ext>
+            </p:extLst>
+          </p:nvPr>
+        </p:nvSpPr>
+        <p:spPr>
+          <a:xfrm>
+            <a:off x="0" y="2"/>
+            <a:ext cx="4636008" cy="6857998"/>
+          </a:xfrm>
+          <a:prstGeom prst="rect">
+            <a:avLst/>
+          </a:prstGeom>
+          <a:solidFill>
+            <a:schemeClr val="tx1">
+              <a:lumMod val="85000"/>
+              <a:lumOff val="15000"/>
+            </a:schemeClr>
+          </a:solidFill>
+          <a:ln>
+            <a:noFill/>
+          </a:ln>
+          <a:effectLst/>
+        </p:spPr>
+        <p:style>
+          <a:lnRef idx="1">
+            <a:schemeClr val="accent1"/>
+          </a:lnRef>
+          <a:fillRef idx="3">
+            <a:schemeClr val="accent1"/>
+          </a:fillRef>
+          <a:effectRef idx="2">
+            <a:schemeClr val="accent1"/>
+          </a:effectRef>
+          <a:fontRef idx="minor">
+            <a:schemeClr val="lt1"/>
+          </a:fontRef>
+        </p:style>
+        <p:txBody>
+          <a:bodyPr rtlCol="0" anchor="ctr"/>
+          <a:lstStyle/>
+          <a:p>
+            <a:pPr algn="ctr" defTabSz="457200"/>
+            <a:endParaRPr lang="en-US">
+              <a:solidFill>
+                <a:srgbClr val="FFFFFF"/>
+              </a:solidFill>
+              <a:latin typeface="Calibri" panose="020F0502020204030204"/>
+            </a:endParaRPr>
+          </a:p>
+        </p:txBody>
+      </p:sp>
+      <p:sp>
+        <p:nvSpPr>
+          <p:cNvPr id="2" name="Title 1"/>
+          <p:cNvSpPr>
+            <a:spLocks noGrp="1"/>
+          </p:cNvSpPr>
+          <p:nvPr>
+            <p:ph type="title"/>
+          </p:nvPr>
+        </p:nvSpPr>
+        <p:spPr>
+          <a:xfrm>
+            <a:off x="484484" y="31194"/>
+            <a:ext cx="3667039" cy="1676603"/>
+          </a:xfrm>
+        </p:spPr>
+        <p:txBody>
+          <a:bodyPr vert="horz" lIns="91440" tIns="45720" rIns="91440" bIns="45720" rtlCol="0" anchor="ctr">
+            <a:normAutofit/>
+          </a:bodyPr>
+          <a:lstStyle/>
+          <a:p>
+            <a:pPr algn="ctr"/>
+            <a:r>
+              <a:rPr lang="en-US" sz="3600" dirty="0">
+                <a:solidFill>
+                  <a:schemeClr val="bg1"/>
+                </a:solidFill>
+                <a:latin typeface="Elephant" panose="02020904090505020303" pitchFamily="18" charset="0"/>
+              </a:rPr>
+              <a:t>Database</a:t>
+            </a:r>
+          </a:p>
+        </p:txBody>
+      </p:sp>
+      <p:sp>
+        <p:nvSpPr>
+          <p:cNvPr id="4" name="Text Placeholder 3"/>
+          <p:cNvSpPr>
+            <a:spLocks noGrp="1"/>
+          </p:cNvSpPr>
+          <p:nvPr>
+            <p:ph type="body" sz="half" idx="2"/>
+          </p:nvPr>
+        </p:nvSpPr>
+        <p:spPr>
+          <a:xfrm>
+            <a:off x="484484" y="4517947"/>
+            <a:ext cx="3667036" cy="3779520"/>
+          </a:xfrm>
+        </p:spPr>
+        <p:txBody>
+          <a:bodyPr vert="horz" lIns="91440" tIns="45720" rIns="91440" bIns="45720" rtlCol="0">
+            <a:normAutofit/>
+          </a:bodyPr>
+          <a:lstStyle/>
+          <a:p>
+            <a:pPr algn="ctr"/>
+            <a:r>
+              <a:rPr lang="en-US" sz="2400" dirty="0">
+                <a:solidFill>
+                  <a:schemeClr val="bg1"/>
+                </a:solidFill>
+                <a:latin typeface="Batang" panose="02030600000101010101" pitchFamily="18" charset="-127"/>
+                <a:ea typeface="Batang" panose="02030600000101010101" pitchFamily="18" charset="-127"/>
+              </a:rPr>
+              <a:t>Purpose:</a:t>
+            </a:r>
+          </a:p>
+          <a:p>
+            <a:pPr algn="ctr"/>
+            <a:r>
+              <a:rPr lang="en-US" sz="2400" dirty="0">
+                <a:solidFill>
+                  <a:schemeClr val="bg1"/>
+                </a:solidFill>
+                <a:latin typeface="Batang" panose="02030600000101010101" pitchFamily="18" charset="-127"/>
+                <a:ea typeface="Batang" panose="02030600000101010101" pitchFamily="18" charset="-127"/>
+              </a:rPr>
+              <a:t>To store information for events</a:t>
+            </a:r>
+          </a:p>
+          <a:p>
+            <a:pPr algn="ctr"/>
+            <a:r>
+              <a:rPr lang="en-US" sz="6000" dirty="0">
+                <a:solidFill>
+                  <a:srgbClr val="FF0000"/>
+                </a:solidFill>
+                <a:latin typeface="Batang" panose="02030600000101010101" pitchFamily="18" charset="-127"/>
+                <a:ea typeface="Batang" panose="02030600000101010101" pitchFamily="18" charset="-127"/>
+              </a:rPr>
+              <a:t>4</a:t>
+            </a:r>
+          </a:p>
+        </p:txBody>
+      </p:sp>
+      <p:pic>
+        <p:nvPicPr>
+          <p:cNvPr id="8" name="Picture 7"/>
+          <p:cNvPicPr>
+            <a:picLocks noChangeAspect="1"/>
+          </p:cNvPicPr>
+          <p:nvPr/>
+        </p:nvPicPr>
+        <p:blipFill>
+          <a:blip r:embed="rId2">
+            <a:extLst>
+              <a:ext uri="{28A0092B-C50C-407E-A947-70E740481C1C}">
+                <a14:useLocalDpi xmlns:a14="http://schemas.microsoft.com/office/drawing/2010/main" val="0"/>
+              </a:ext>
+            </a:extLst>
+          </a:blip>
+          <a:stretch>
+            <a:fillRect/>
+          </a:stretch>
+        </p:blipFill>
+        <p:spPr>
+          <a:xfrm>
+            <a:off x="889254" y="1470661"/>
+            <a:ext cx="2857500" cy="2857500"/>
+          </a:xfrm>
+          <a:prstGeom prst="rect">
+            <a:avLst/>
+          </a:prstGeom>
+        </p:spPr>
+      </p:pic>
+      <p:pic>
+        <p:nvPicPr>
+          <p:cNvPr id="11" name="Picture 10"/>
+          <p:cNvPicPr>
+            <a:picLocks noChangeAspect="1"/>
+          </p:cNvPicPr>
+          <p:nvPr/>
+        </p:nvPicPr>
+        <p:blipFill>
+          <a:blip r:embed="rId3">
+            <a:extLst>
+              <a:ext uri="{28A0092B-C50C-407E-A947-70E740481C1C}">
+                <a14:useLocalDpi xmlns:a14="http://schemas.microsoft.com/office/drawing/2010/main" val="0"/>
+              </a:ext>
+            </a:extLst>
+          </a:blip>
+          <a:stretch>
+            <a:fillRect/>
+          </a:stretch>
+        </p:blipFill>
+        <p:spPr>
+          <a:xfrm>
+            <a:off x="6096000" y="692459"/>
+            <a:ext cx="5382376" cy="5468113"/>
+          </a:xfrm>
+          <a:prstGeom prst="rect">
+            <a:avLst/>
+          </a:prstGeom>
+        </p:spPr>
+      </p:pic>
+    </p:spTree>
+    <p:extLst>
+      <p:ext uri="{BB962C8B-B14F-4D97-AF65-F5344CB8AC3E}">
+        <p14:creationId xmlns:p14="http://schemas.microsoft.com/office/powerpoint/2010/main" val="3233017143"/>
+      </p:ext>
+    </p:extLst>
+  </p:cSld>
+  <p:clrMapOvr>
+    <a:masterClrMapping/>
+  </p:clrMapOvr>
+</p:sld>
+</file>
+
+<file path=ppt/slides/slide9.xml><?xml version="1.0" encoding="utf-8"?>
+<p:sld xmlns:a="http://schemas.openxmlformats.org/drawingml/2006/main" xmlns:r="http://schemas.openxmlformats.org/officeDocument/2006/relationships" xmlns:p="http://schemas.openxmlformats.org/presentationml/2006/main">
+  <p:cSld>
+    <p:spTree>
+      <p:nvGrpSpPr>
+        <p:cNvPr id="1" name=""/>
+        <p:cNvGrpSpPr/>
+        <p:nvPr/>
+      </p:nvGrpSpPr>
+      <p:grpSpPr>
+        <a:xfrm>
+          <a:off x="0" y="0"/>
+          <a:ext cx="0" cy="0"/>
+          <a:chOff x="0" y="0"/>
+          <a:chExt cx="0" cy="0"/>
+        </a:xfrm>
+      </p:grpSpPr>
+      <p:sp>
+        <p:nvSpPr>
+          <p:cNvPr id="12" name="Rectangle 11"/>
+          <p:cNvSpPr>
+            <a:spLocks noGrp="1" noRot="1" noChangeAspect="1" noMove="1" noResize="1" noEditPoints="1" noAdjustHandles="1" noChangeArrowheads="1" noChangeShapeType="1" noTextEdit="1"/>
+          </p:cNvSpPr>
+          <p:nvPr>
+            <p:extLst>
+              <p:ext uri="{386F3935-93C4-4BCD-93E2-E3B085C9AB24}">
+                <p16:designElem xmlns:p16="http://schemas.microsoft.com/office/powerpoint/2015/main" val="1"/>
+              </p:ext>
+            </p:extLst>
+          </p:nvPr>
+        </p:nvSpPr>
+        <p:spPr bwMode="white">
+          <a:xfrm>
+            <a:off x="0" y="0"/>
+            <a:ext cx="12192000" cy="6858000"/>
+          </a:xfrm>
+          <a:prstGeom prst="rect">
+            <a:avLst/>
+          </a:prstGeom>
+          <a:solidFill>
+            <a:schemeClr val="bg1"/>
+          </a:solidFill>
+          <a:ln>
+            <a:noFill/>
+          </a:ln>
+          <a:effectLst/>
+        </p:spPr>
+      </p:sp>
+      <p:sp>
+        <p:nvSpPr>
+          <p:cNvPr id="14" name="Rectangle 13"/>
+          <p:cNvSpPr>
+            <a:spLocks noGrp="1" noRot="1" noChangeAspect="1" noMove="1" noResize="1" noEditPoints="1" noAdjustHandles="1" noChangeArrowheads="1" noChangeShapeType="1" noTextEdit="1"/>
+          </p:cNvSpPr>
+          <p:nvPr>
+            <p:extLst>
+              <p:ext uri="{386F3935-93C4-4BCD-93E2-E3B085C9AB24}">
+                <p16:designElem xmlns:p16="http://schemas.microsoft.com/office/powerpoint/2015/main" val="1"/>
+              </p:ext>
+            </p:extLst>
+          </p:nvPr>
+        </p:nvSpPr>
+        <p:spPr>
+          <a:xfrm>
+            <a:off x="0" y="2"/>
+            <a:ext cx="4636008" cy="6857998"/>
+          </a:xfrm>
+          <a:prstGeom prst="rect">
+            <a:avLst/>
+          </a:prstGeom>
+          <a:solidFill>
+            <a:schemeClr val="tx1">
+              <a:lumMod val="85000"/>
+              <a:lumOff val="15000"/>
+            </a:schemeClr>
+          </a:solidFill>
+          <a:ln>
+            <a:noFill/>
+          </a:ln>
+          <a:effectLst/>
+        </p:spPr>
+        <p:style>
+          <a:lnRef idx="1">
+            <a:schemeClr val="accent1"/>
+          </a:lnRef>
+          <a:fillRef idx="3">
+            <a:schemeClr val="accent1"/>
+          </a:fillRef>
+          <a:effectRef idx="2">
+            <a:schemeClr val="accent1"/>
+          </a:effectRef>
+          <a:fontRef idx="minor">
+            <a:schemeClr val="lt1"/>
+          </a:fontRef>
+        </p:style>
+        <p:txBody>
+          <a:bodyPr rtlCol="0" anchor="ctr"/>
+          <a:lstStyle/>
+          <a:p>
+            <a:pPr algn="ctr" defTabSz="457200"/>
+            <a:endParaRPr lang="en-US">
+              <a:solidFill>
+                <a:srgbClr val="FFFFFF"/>
+              </a:solidFill>
+              <a:latin typeface="Calibri" panose="020F0502020204030204"/>
+            </a:endParaRPr>
+          </a:p>
+        </p:txBody>
+      </p:sp>
+      <p:pic>
+        <p:nvPicPr>
+          <p:cNvPr id="7" name="Picture Placeholder 6"/>
+          <p:cNvPicPr>
+            <a:picLocks noGrp="1" noChangeAspect="1"/>
+          </p:cNvPicPr>
+          <p:nvPr>
+            <p:ph type="pic" idx="1"/>
+          </p:nvPr>
+        </p:nvPicPr>
+        <p:blipFill rotWithShape="1">
+          <a:blip r:embed="rId2">
+            <a:extLst>
+              <a:ext uri="{28A0092B-C50C-407E-A947-70E740481C1C}">
+                <a14:useLocalDpi xmlns:a14="http://schemas.microsoft.com/office/drawing/2010/main" val="0"/>
+              </a:ext>
+            </a:extLst>
+          </a:blip>
+          <a:srcRect l="15005" r="16920"/>
+          <a:stretch/>
+        </p:blipFill>
+        <p:spPr>
+          <a:xfrm>
+            <a:off x="174271" y="2700337"/>
+            <a:ext cx="2054580" cy="1764029"/>
+          </a:xfrm>
+          <a:prstGeom prst="rect">
+            <a:avLst/>
+          </a:prstGeom>
+          <a:effectLst/>
+        </p:spPr>
+      </p:pic>
+      <p:sp>
+        <p:nvSpPr>
+          <p:cNvPr id="2" name="Title 1"/>
+          <p:cNvSpPr>
+            <a:spLocks noGrp="1"/>
+          </p:cNvSpPr>
+          <p:nvPr>
+            <p:ph type="title"/>
+          </p:nvPr>
+        </p:nvSpPr>
+        <p:spPr>
+          <a:xfrm>
+            <a:off x="1349016" y="-100118"/>
+            <a:ext cx="3667039" cy="1676603"/>
+          </a:xfrm>
+        </p:spPr>
+        <p:txBody>
+          <a:bodyPr vert="horz" lIns="91440" tIns="45720" rIns="91440" bIns="45720" rtlCol="0" anchor="ctr">
+            <a:normAutofit/>
+          </a:bodyPr>
+          <a:lstStyle/>
+          <a:p>
+            <a:r>
+              <a:rPr lang="en-US" sz="3600" dirty="0">
+                <a:solidFill>
+                  <a:schemeClr val="bg1"/>
+                </a:solidFill>
+                <a:latin typeface="Elephant" panose="02020904090505020303" pitchFamily="18" charset="0"/>
+              </a:rPr>
+              <a:t>Testing</a:t>
+            </a:r>
+          </a:p>
+        </p:txBody>
+      </p:sp>
+      <p:sp>
+        <p:nvSpPr>
+          <p:cNvPr id="4" name="Text Placeholder 3"/>
+          <p:cNvSpPr>
+            <a:spLocks noGrp="1"/>
+          </p:cNvSpPr>
+          <p:nvPr>
+            <p:ph type="body" sz="half" idx="2"/>
+          </p:nvPr>
+        </p:nvSpPr>
+        <p:spPr>
+          <a:xfrm>
+            <a:off x="484486" y="4464366"/>
+            <a:ext cx="3667036" cy="3779520"/>
+          </a:xfrm>
+        </p:spPr>
+        <p:txBody>
+          <a:bodyPr vert="horz" lIns="91440" tIns="45720" rIns="91440" bIns="45720" rtlCol="0">
+            <a:normAutofit/>
+          </a:bodyPr>
+          <a:lstStyle/>
+          <a:p>
+            <a:pPr algn="ctr"/>
+            <a:r>
+              <a:rPr lang="en-US" sz="2400" dirty="0">
+                <a:solidFill>
+                  <a:schemeClr val="bg1"/>
+                </a:solidFill>
+                <a:latin typeface="Batang" panose="02030600000101010101" pitchFamily="18" charset="-127"/>
+                <a:ea typeface="Batang" panose="02030600000101010101" pitchFamily="18" charset="-127"/>
+              </a:rPr>
+              <a:t>Purpose: </a:t>
+            </a:r>
+          </a:p>
+          <a:p>
+            <a:pPr algn="ctr"/>
+            <a:r>
+              <a:rPr lang="en-US" sz="2400" dirty="0">
+                <a:solidFill>
+                  <a:schemeClr val="bg1"/>
+                </a:solidFill>
+                <a:latin typeface="Batang" panose="02030600000101010101" pitchFamily="18" charset="-127"/>
+                <a:ea typeface="Batang" panose="02030600000101010101" pitchFamily="18" charset="-127"/>
+              </a:rPr>
+              <a:t>Used these frameworks to develop unit tests for the code</a:t>
+            </a:r>
+          </a:p>
+          <a:p>
+            <a:pPr algn="ctr"/>
+            <a:r>
+              <a:rPr lang="en-US" sz="6000" dirty="0">
+                <a:solidFill>
+                  <a:srgbClr val="FF0000"/>
+                </a:solidFill>
+                <a:latin typeface="Batang" panose="02030600000101010101" pitchFamily="18" charset="-127"/>
+                <a:ea typeface="Batang" panose="02030600000101010101" pitchFamily="18" charset="-127"/>
+              </a:rPr>
+              <a:t>5</a:t>
+            </a:r>
+          </a:p>
+        </p:txBody>
+      </p:sp>
+      <p:pic>
+        <p:nvPicPr>
+          <p:cNvPr id="8" name="Picture 7"/>
+          <p:cNvPicPr>
+            <a:picLocks noChangeAspect="1"/>
+          </p:cNvPicPr>
+          <p:nvPr/>
+        </p:nvPicPr>
+        <p:blipFill>
+          <a:blip r:embed="rId3">
+            <a:extLst>
+              <a:ext uri="{28A0092B-C50C-407E-A947-70E740481C1C}">
+                <a14:useLocalDpi xmlns:a14="http://schemas.microsoft.com/office/drawing/2010/main" val="0"/>
+              </a:ext>
+            </a:extLst>
+          </a:blip>
+          <a:stretch>
+            <a:fillRect/>
+          </a:stretch>
+        </p:blipFill>
+        <p:spPr>
+          <a:xfrm>
+            <a:off x="2228851" y="1218708"/>
+            <a:ext cx="2221992" cy="1859772"/>
+          </a:xfrm>
+          <a:prstGeom prst="rect">
+            <a:avLst/>
+          </a:prstGeom>
+        </p:spPr>
+      </p:pic>
+      <p:pic>
+        <p:nvPicPr>
+          <p:cNvPr id="9" name="Picture 8"/>
+          <p:cNvPicPr>
+            <a:picLocks noChangeAspect="1"/>
+          </p:cNvPicPr>
+          <p:nvPr/>
+        </p:nvPicPr>
+        <p:blipFill>
+          <a:blip r:embed="rId4">
+            <a:extLst>
+              <a:ext uri="{28A0092B-C50C-407E-A947-70E740481C1C}">
+                <a14:useLocalDpi xmlns:a14="http://schemas.microsoft.com/office/drawing/2010/main" val="0"/>
+              </a:ext>
+            </a:extLst>
+          </a:blip>
+          <a:stretch>
+            <a:fillRect/>
+          </a:stretch>
+        </p:blipFill>
+        <p:spPr>
+          <a:xfrm>
+            <a:off x="4673042" y="571101"/>
+            <a:ext cx="7087589" cy="5715798"/>
+          </a:xfrm>
+          <a:prstGeom prst="rect">
+            <a:avLst/>
+          </a:prstGeom>
+        </p:spPr>
+      </p:pic>
+    </p:spTree>
+    <p:extLst>
+      <p:ext uri="{BB962C8B-B14F-4D97-AF65-F5344CB8AC3E}">
+        <p14:creationId xmlns:p14="http://schemas.microsoft.com/office/powerpoint/2010/main" val="540850777"/>
       </p:ext>
     </p:extLst>
   </p:cSld>

</xml_diff>